<commit_message>
jerk for going down, also include when sympy gives 0 jerk
</commit_message>
<xml_diff>
--- a/presentations_and_figures/240205.pptx
+++ b/presentations_and_figures/240205.pptx
@@ -9,12 +9,11 @@
     <p:sldId id="281" r:id="rId3"/>
     <p:sldId id="282" r:id="rId4"/>
     <p:sldId id="283" r:id="rId5"/>
-    <p:sldId id="284" r:id="rId6"/>
-    <p:sldId id="287" r:id="rId7"/>
-    <p:sldId id="289" r:id="rId8"/>
-    <p:sldId id="288" r:id="rId9"/>
-    <p:sldId id="285" r:id="rId10"/>
-    <p:sldId id="286" r:id="rId11"/>
+    <p:sldId id="287" r:id="rId6"/>
+    <p:sldId id="289" r:id="rId7"/>
+    <p:sldId id="288" r:id="rId8"/>
+    <p:sldId id="285" r:id="rId9"/>
+    <p:sldId id="286" r:id="rId10"/>
   </p:sldIdLst>
   <p:sldSz cx="12192000" cy="6858000"/>
   <p:notesSz cx="6858000" cy="9144000"/>
@@ -3410,74 +3409,6 @@
 </p:sld>
 </file>
 
-<file path=ppt/slides/slide10.xml><?xml version="1.0" encoding="utf-8"?>
-<p:sld xmlns:a="http://schemas.openxmlformats.org/drawingml/2006/main" xmlns:r="http://schemas.openxmlformats.org/officeDocument/2006/relationships" xmlns:p="http://schemas.openxmlformats.org/presentationml/2006/main">
-  <p:cSld>
-    <p:spTree>
-      <p:nvGrpSpPr>
-        <p:cNvPr id="1" name=""/>
-        <p:cNvGrpSpPr/>
-        <p:nvPr/>
-      </p:nvGrpSpPr>
-      <p:grpSpPr>
-        <a:xfrm>
-          <a:off x="0" y="0"/>
-          <a:ext cx="0" cy="0"/>
-          <a:chOff x="0" y="0"/>
-          <a:chExt cx="0" cy="0"/>
-        </a:xfrm>
-      </p:grpSpPr>
-      <p:sp>
-        <p:nvSpPr>
-          <p:cNvPr id="2" name="Title 1">
-            <a:extLst>
-              <a:ext uri="{FF2B5EF4-FFF2-40B4-BE49-F238E27FC236}">
-                <a16:creationId xmlns:a16="http://schemas.microsoft.com/office/drawing/2014/main" id="{C84FA0E9-798D-DF27-7233-6D95D2E2DEC8}"/>
-              </a:ext>
-            </a:extLst>
-          </p:cNvPr>
-          <p:cNvSpPr>
-            <a:spLocks noGrp="1"/>
-          </p:cNvSpPr>
-          <p:nvPr>
-            <p:ph type="title"/>
-          </p:nvPr>
-        </p:nvSpPr>
-        <p:spPr>
-          <a:xfrm>
-            <a:off x="0" y="0"/>
-            <a:ext cx="10515600" cy="544356"/>
-          </a:xfrm>
-        </p:spPr>
-        <p:txBody>
-          <a:bodyPr>
-            <a:normAutofit/>
-          </a:bodyPr>
-          <a:lstStyle/>
-          <a:p>
-            <a:r>
-              <a:rPr lang="en-US" sz="2400" b="1" dirty="0">
-                <a:latin typeface="Arial" panose="020B0604020202020204" pitchFamily="34" charset="0"/>
-                <a:cs typeface="Arial" panose="020B0604020202020204" pitchFamily="34" charset="0"/>
-              </a:rPr>
-              <a:t>Reaction times</a:t>
-            </a:r>
-          </a:p>
-        </p:txBody>
-      </p:sp>
-    </p:spTree>
-    <p:extLst>
-      <p:ext uri="{BB962C8B-B14F-4D97-AF65-F5344CB8AC3E}">
-        <p14:creationId xmlns:p14="http://schemas.microsoft.com/office/powerpoint/2010/main" val="3037425040"/>
-      </p:ext>
-    </p:extLst>
-  </p:cSld>
-  <p:clrMapOvr>
-    <a:masterClrMapping/>
-  </p:clrMapOvr>
-</p:sld>
-</file>
-
 <file path=ppt/slides/slide2.xml><?xml version="1.0" encoding="utf-8"?>
 <p:sld xmlns:a="http://schemas.openxmlformats.org/drawingml/2006/main" xmlns:r="http://schemas.openxmlformats.org/officeDocument/2006/relationships" xmlns:p="http://schemas.openxmlformats.org/presentationml/2006/main">
   <p:cSld>
@@ -3529,6 +3460,161 @@
                 <a:cs typeface="Arial" panose="020B0604020202020204" pitchFamily="34" charset="0"/>
               </a:rPr>
               <a:t>ANM7 Second Threshold Aligned Movements</a:t>
+            </a:r>
+          </a:p>
+        </p:txBody>
+      </p:sp>
+      <p:pic>
+        <p:nvPicPr>
+          <p:cNvPr id="3" name="Picture 2">
+            <a:extLst>
+              <a:ext uri="{FF2B5EF4-FFF2-40B4-BE49-F238E27FC236}">
+                <a16:creationId xmlns:a16="http://schemas.microsoft.com/office/drawing/2014/main" id="{B9769111-2DCF-B011-2345-BDC1E2331DEE}"/>
+              </a:ext>
+            </a:extLst>
+          </p:cNvPr>
+          <p:cNvPicPr>
+            <a:picLocks noChangeAspect="1"/>
+          </p:cNvPicPr>
+          <p:nvPr/>
+        </p:nvPicPr>
+        <p:blipFill>
+          <a:blip r:embed="rId2"/>
+          <a:stretch>
+            <a:fillRect/>
+          </a:stretch>
+        </p:blipFill>
+        <p:spPr>
+          <a:xfrm>
+            <a:off x="8339958" y="691702"/>
+            <a:ext cx="3314700" cy="2400300"/>
+          </a:xfrm>
+          <a:prstGeom prst="rect">
+            <a:avLst/>
+          </a:prstGeom>
+        </p:spPr>
+      </p:pic>
+      <p:pic>
+        <p:nvPicPr>
+          <p:cNvPr id="4" name="Picture 3">
+            <a:extLst>
+              <a:ext uri="{FF2B5EF4-FFF2-40B4-BE49-F238E27FC236}">
+                <a16:creationId xmlns:a16="http://schemas.microsoft.com/office/drawing/2014/main" id="{7B0EC68C-EBBD-823C-FBAE-19FF526F56FD}"/>
+              </a:ext>
+            </a:extLst>
+          </p:cNvPr>
+          <p:cNvPicPr>
+            <a:picLocks noChangeAspect="1"/>
+          </p:cNvPicPr>
+          <p:nvPr/>
+        </p:nvPicPr>
+        <p:blipFill>
+          <a:blip r:embed="rId3"/>
+          <a:stretch>
+            <a:fillRect/>
+          </a:stretch>
+        </p:blipFill>
+        <p:spPr>
+          <a:xfrm>
+            <a:off x="8244710" y="3667643"/>
+            <a:ext cx="3314700" cy="2400300"/>
+          </a:xfrm>
+          <a:prstGeom prst="rect">
+            <a:avLst/>
+          </a:prstGeom>
+        </p:spPr>
+      </p:pic>
+      <p:pic>
+        <p:nvPicPr>
+          <p:cNvPr id="5" name="Picture 4">
+            <a:extLst>
+              <a:ext uri="{FF2B5EF4-FFF2-40B4-BE49-F238E27FC236}">
+                <a16:creationId xmlns:a16="http://schemas.microsoft.com/office/drawing/2014/main" id="{D80E4B0B-BE76-8DD8-0AD7-975C31E856CD}"/>
+              </a:ext>
+            </a:extLst>
+          </p:cNvPr>
+          <p:cNvPicPr>
+            <a:picLocks noChangeAspect="1"/>
+          </p:cNvPicPr>
+          <p:nvPr/>
+        </p:nvPicPr>
+        <p:blipFill>
+          <a:blip r:embed="rId4"/>
+          <a:stretch>
+            <a:fillRect/>
+          </a:stretch>
+        </p:blipFill>
+        <p:spPr>
+          <a:xfrm>
+            <a:off x="128752" y="588848"/>
+            <a:ext cx="7772400" cy="2503154"/>
+          </a:xfrm>
+          <a:prstGeom prst="rect">
+            <a:avLst/>
+          </a:prstGeom>
+        </p:spPr>
+      </p:pic>
+      <p:pic>
+        <p:nvPicPr>
+          <p:cNvPr id="6" name="Picture 5">
+            <a:extLst>
+              <a:ext uri="{FF2B5EF4-FFF2-40B4-BE49-F238E27FC236}">
+                <a16:creationId xmlns:a16="http://schemas.microsoft.com/office/drawing/2014/main" id="{B0C1B67A-5C1B-18F3-4EAE-C7129A548389}"/>
+              </a:ext>
+            </a:extLst>
+          </p:cNvPr>
+          <p:cNvPicPr>
+            <a:picLocks noChangeAspect="1"/>
+          </p:cNvPicPr>
+          <p:nvPr/>
+        </p:nvPicPr>
+        <p:blipFill>
+          <a:blip r:embed="rId5"/>
+          <a:stretch>
+            <a:fillRect/>
+          </a:stretch>
+        </p:blipFill>
+        <p:spPr>
+          <a:xfrm>
+            <a:off x="128752" y="3564789"/>
+            <a:ext cx="7772400" cy="2503154"/>
+          </a:xfrm>
+          <a:prstGeom prst="rect">
+            <a:avLst/>
+          </a:prstGeom>
+        </p:spPr>
+      </p:pic>
+      <p:sp>
+        <p:nvSpPr>
+          <p:cNvPr id="7" name="TextBox 6">
+            <a:extLst>
+              <a:ext uri="{FF2B5EF4-FFF2-40B4-BE49-F238E27FC236}">
+                <a16:creationId xmlns:a16="http://schemas.microsoft.com/office/drawing/2014/main" id="{33DCA85C-CC0D-FD59-C01D-305E0B0FFD48}"/>
+              </a:ext>
+            </a:extLst>
+          </p:cNvPr>
+          <p:cNvSpPr txBox="1"/>
+          <p:nvPr/>
+        </p:nvSpPr>
+        <p:spPr>
+          <a:xfrm>
+            <a:off x="11842280" y="-201039"/>
+            <a:ext cx="3699575" cy="2585323"/>
+          </a:xfrm>
+          <a:prstGeom prst="rect">
+            <a:avLst/>
+          </a:prstGeom>
+          <a:noFill/>
+        </p:spPr>
+        <p:txBody>
+          <a:bodyPr wrap="square" rtlCol="0">
+            <a:spAutoFit/>
+          </a:bodyPr>
+          <a:lstStyle/>
+          <a:p>
+            <a:r>
+              <a:rPr lang="en-US" dirty="0"/>
+              <a:t>From only 2 days, it problematically looks like mice are learning to keep the lever closer during the threshold calculation—I want to plot the voltage baseline across days at some point to make sure this isn’t the case (and avoid all of our analysis trends being due to higher baseline/thresholds)</a:t>
             </a:r>
           </a:p>
         </p:txBody>
@@ -3596,17 +3682,107 @@
                 <a:latin typeface="Arial" panose="020B0604020202020204" pitchFamily="34" charset="0"/>
                 <a:cs typeface="Arial" panose="020B0604020202020204" pitchFamily="34" charset="0"/>
               </a:rPr>
-              <a:t>ANA2 Second Threshold Aligned Movements</a:t>
-            </a:r>
-          </a:p>
-        </p:txBody>
-      </p:sp>
-      <p:sp>
-        <p:nvSpPr>
-          <p:cNvPr id="3" name="TextBox 2">
-            <a:extLst>
-              <a:ext uri="{FF2B5EF4-FFF2-40B4-BE49-F238E27FC236}">
-                <a16:creationId xmlns:a16="http://schemas.microsoft.com/office/drawing/2014/main" id="{4118E070-043C-89C0-D177-BD60BE8E04F4}"/>
+              <a:t>ANM8 Second Threshold Aligned Movements</a:t>
+            </a:r>
+          </a:p>
+        </p:txBody>
+      </p:sp>
+      <p:pic>
+        <p:nvPicPr>
+          <p:cNvPr id="4" name="Picture 3">
+            <a:extLst>
+              <a:ext uri="{FF2B5EF4-FFF2-40B4-BE49-F238E27FC236}">
+                <a16:creationId xmlns:a16="http://schemas.microsoft.com/office/drawing/2014/main" id="{B5AAD66E-ABBB-C8C6-71C2-D193F11E15C1}"/>
+              </a:ext>
+            </a:extLst>
+          </p:cNvPr>
+          <p:cNvPicPr>
+            <a:picLocks noChangeAspect="1"/>
+          </p:cNvPicPr>
+          <p:nvPr/>
+        </p:nvPicPr>
+        <p:blipFill>
+          <a:blip r:embed="rId2"/>
+          <a:stretch>
+            <a:fillRect/>
+          </a:stretch>
+        </p:blipFill>
+        <p:spPr>
+          <a:xfrm>
+            <a:off x="8179019" y="544356"/>
+            <a:ext cx="3314700" cy="2400300"/>
+          </a:xfrm>
+          <a:prstGeom prst="rect">
+            <a:avLst/>
+          </a:prstGeom>
+        </p:spPr>
+      </p:pic>
+      <p:pic>
+        <p:nvPicPr>
+          <p:cNvPr id="5" name="Picture 4">
+            <a:extLst>
+              <a:ext uri="{FF2B5EF4-FFF2-40B4-BE49-F238E27FC236}">
+                <a16:creationId xmlns:a16="http://schemas.microsoft.com/office/drawing/2014/main" id="{95D3AB80-2467-7A00-73C6-78F30EA8F29F}"/>
+              </a:ext>
+            </a:extLst>
+          </p:cNvPr>
+          <p:cNvPicPr>
+            <a:picLocks noChangeAspect="1"/>
+          </p:cNvPicPr>
+          <p:nvPr/>
+        </p:nvPicPr>
+        <p:blipFill>
+          <a:blip r:embed="rId3"/>
+          <a:stretch>
+            <a:fillRect/>
+          </a:stretch>
+        </p:blipFill>
+        <p:spPr>
+          <a:xfrm>
+            <a:off x="8394483" y="3674137"/>
+            <a:ext cx="3352800" cy="2400300"/>
+          </a:xfrm>
+          <a:prstGeom prst="rect">
+            <a:avLst/>
+          </a:prstGeom>
+        </p:spPr>
+      </p:pic>
+      <p:pic>
+        <p:nvPicPr>
+          <p:cNvPr id="6" name="Picture 5">
+            <a:extLst>
+              <a:ext uri="{FF2B5EF4-FFF2-40B4-BE49-F238E27FC236}">
+                <a16:creationId xmlns:a16="http://schemas.microsoft.com/office/drawing/2014/main" id="{3B6918A0-C2D1-2331-7FFC-3D6690DB0991}"/>
+              </a:ext>
+            </a:extLst>
+          </p:cNvPr>
+          <p:cNvPicPr>
+            <a:picLocks noChangeAspect="1"/>
+          </p:cNvPicPr>
+          <p:nvPr/>
+        </p:nvPicPr>
+        <p:blipFill>
+          <a:blip r:embed="rId4"/>
+          <a:stretch>
+            <a:fillRect/>
+          </a:stretch>
+        </p:blipFill>
+        <p:spPr>
+          <a:xfrm>
+            <a:off x="0" y="800900"/>
+            <a:ext cx="7772400" cy="2503154"/>
+          </a:xfrm>
+          <a:prstGeom prst="rect">
+            <a:avLst/>
+          </a:prstGeom>
+        </p:spPr>
+      </p:pic>
+      <p:sp>
+        <p:nvSpPr>
+          <p:cNvPr id="7" name="TextBox 6">
+            <a:extLst>
+              <a:ext uri="{FF2B5EF4-FFF2-40B4-BE49-F238E27FC236}">
+                <a16:creationId xmlns:a16="http://schemas.microsoft.com/office/drawing/2014/main" id="{E51C8047-7264-6A75-9CAF-F3B31A6BE440}"/>
               </a:ext>
             </a:extLst>
           </p:cNvPr>
@@ -3615,8 +3791,8 @@
         </p:nvSpPr>
         <p:spPr>
           <a:xfrm>
-            <a:off x="8037723" y="1137904"/>
-            <a:ext cx="3699575" cy="2585323"/>
+            <a:off x="10695214" y="1077686"/>
+            <a:ext cx="627095" cy="369332"/>
           </a:xfrm>
           <a:prstGeom prst="rect">
             <a:avLst/>
@@ -3624,18 +3800,48 @@
           <a:noFill/>
         </p:spPr>
         <p:txBody>
-          <a:bodyPr wrap="square" rtlCol="0">
+          <a:bodyPr wrap="none" rtlCol="0">
             <a:spAutoFit/>
           </a:bodyPr>
           <a:lstStyle/>
           <a:p>
             <a:r>
               <a:rPr lang="en-US" dirty="0"/>
-              <a:t>From only 3 days, it problematically looks like mice are learning to keep the lever closer during the threshold calculation—I want to plot the voltage baseline across days at some point to make sure this isn’t the case (and avoid all of our analysis trends being due to higher baseline/thresholds)</a:t>
-            </a:r>
-          </a:p>
-        </p:txBody>
-      </p:sp>
+              <a:t>Uh...</a:t>
+            </a:r>
+          </a:p>
+        </p:txBody>
+      </p:sp>
+      <p:pic>
+        <p:nvPicPr>
+          <p:cNvPr id="10" name="Picture 9">
+            <a:extLst>
+              <a:ext uri="{FF2B5EF4-FFF2-40B4-BE49-F238E27FC236}">
+                <a16:creationId xmlns:a16="http://schemas.microsoft.com/office/drawing/2014/main" id="{A3A3C37E-D8E9-78AE-99AB-67C221DE496B}"/>
+              </a:ext>
+            </a:extLst>
+          </p:cNvPr>
+          <p:cNvPicPr>
+            <a:picLocks noChangeAspect="1"/>
+          </p:cNvPicPr>
+          <p:nvPr/>
+        </p:nvPicPr>
+        <p:blipFill>
+          <a:blip r:embed="rId5"/>
+          <a:stretch>
+            <a:fillRect/>
+          </a:stretch>
+        </p:blipFill>
+        <p:spPr>
+          <a:xfrm>
+            <a:off x="201386" y="3674137"/>
+            <a:ext cx="7772400" cy="2503154"/>
+          </a:xfrm>
+          <a:prstGeom prst="rect">
+            <a:avLst/>
+          </a:prstGeom>
+        </p:spPr>
+      </p:pic>
     </p:spTree>
     <p:extLst>
       <p:ext uri="{BB962C8B-B14F-4D97-AF65-F5344CB8AC3E}">
@@ -3699,11 +3905,131 @@
                 <a:latin typeface="Arial" panose="020B0604020202020204" pitchFamily="34" charset="0"/>
                 <a:cs typeface="Arial" panose="020B0604020202020204" pitchFamily="34" charset="0"/>
               </a:rPr>
-              <a:t>ANB1 Second Threshold Aligned Movements</a:t>
-            </a:r>
-          </a:p>
-        </p:txBody>
-      </p:sp>
+              <a:t>ANM1 Second Threshold Aligned Movements</a:t>
+            </a:r>
+          </a:p>
+        </p:txBody>
+      </p:sp>
+      <p:pic>
+        <p:nvPicPr>
+          <p:cNvPr id="3" name="Picture 2">
+            <a:extLst>
+              <a:ext uri="{FF2B5EF4-FFF2-40B4-BE49-F238E27FC236}">
+                <a16:creationId xmlns:a16="http://schemas.microsoft.com/office/drawing/2014/main" id="{79F2308F-DEE3-ACA4-F51F-2CAD5E3C5516}"/>
+              </a:ext>
+            </a:extLst>
+          </p:cNvPr>
+          <p:cNvPicPr>
+            <a:picLocks noChangeAspect="1"/>
+          </p:cNvPicPr>
+          <p:nvPr/>
+        </p:nvPicPr>
+        <p:blipFill>
+          <a:blip r:embed="rId2"/>
+          <a:stretch>
+            <a:fillRect/>
+          </a:stretch>
+        </p:blipFill>
+        <p:spPr>
+          <a:xfrm>
+            <a:off x="8382000" y="544356"/>
+            <a:ext cx="3314700" cy="2400300"/>
+          </a:xfrm>
+          <a:prstGeom prst="rect">
+            <a:avLst/>
+          </a:prstGeom>
+        </p:spPr>
+      </p:pic>
+      <p:pic>
+        <p:nvPicPr>
+          <p:cNvPr id="4" name="Picture 3">
+            <a:extLst>
+              <a:ext uri="{FF2B5EF4-FFF2-40B4-BE49-F238E27FC236}">
+                <a16:creationId xmlns:a16="http://schemas.microsoft.com/office/drawing/2014/main" id="{28C726E7-7831-DE34-55CF-2EDD84BF7468}"/>
+              </a:ext>
+            </a:extLst>
+          </p:cNvPr>
+          <p:cNvPicPr>
+            <a:picLocks noChangeAspect="1"/>
+          </p:cNvPicPr>
+          <p:nvPr/>
+        </p:nvPicPr>
+        <p:blipFill>
+          <a:blip r:embed="rId3"/>
+          <a:stretch>
+            <a:fillRect/>
+          </a:stretch>
+        </p:blipFill>
+        <p:spPr>
+          <a:xfrm>
+            <a:off x="8643257" y="3745660"/>
+            <a:ext cx="3314700" cy="2400300"/>
+          </a:xfrm>
+          <a:prstGeom prst="rect">
+            <a:avLst/>
+          </a:prstGeom>
+        </p:spPr>
+      </p:pic>
+      <p:pic>
+        <p:nvPicPr>
+          <p:cNvPr id="5" name="Picture 4">
+            <a:extLst>
+              <a:ext uri="{FF2B5EF4-FFF2-40B4-BE49-F238E27FC236}">
+                <a16:creationId xmlns:a16="http://schemas.microsoft.com/office/drawing/2014/main" id="{571E7FC7-4BF7-BA1F-9D19-E5A41BD9DF99}"/>
+              </a:ext>
+            </a:extLst>
+          </p:cNvPr>
+          <p:cNvPicPr>
+            <a:picLocks noChangeAspect="1"/>
+          </p:cNvPicPr>
+          <p:nvPr/>
+        </p:nvPicPr>
+        <p:blipFill>
+          <a:blip r:embed="rId4"/>
+          <a:stretch>
+            <a:fillRect/>
+          </a:stretch>
+        </p:blipFill>
+        <p:spPr>
+          <a:xfrm>
+            <a:off x="381000" y="544356"/>
+            <a:ext cx="7772400" cy="2503154"/>
+          </a:xfrm>
+          <a:prstGeom prst="rect">
+            <a:avLst/>
+          </a:prstGeom>
+        </p:spPr>
+      </p:pic>
+      <p:pic>
+        <p:nvPicPr>
+          <p:cNvPr id="6" name="Picture 5">
+            <a:extLst>
+              <a:ext uri="{FF2B5EF4-FFF2-40B4-BE49-F238E27FC236}">
+                <a16:creationId xmlns:a16="http://schemas.microsoft.com/office/drawing/2014/main" id="{13E98576-FB9D-AA9B-9424-62C99D593FF5}"/>
+              </a:ext>
+            </a:extLst>
+          </p:cNvPr>
+          <p:cNvPicPr>
+            <a:picLocks noChangeAspect="1"/>
+          </p:cNvPicPr>
+          <p:nvPr/>
+        </p:nvPicPr>
+        <p:blipFill>
+          <a:blip r:embed="rId5"/>
+          <a:stretch>
+            <a:fillRect/>
+          </a:stretch>
+        </p:blipFill>
+        <p:spPr>
+          <a:xfrm>
+            <a:off x="234043" y="3642806"/>
+            <a:ext cx="7772400" cy="2503154"/>
+          </a:xfrm>
+          <a:prstGeom prst="rect">
+            <a:avLst/>
+          </a:prstGeom>
+        </p:spPr>
+      </p:pic>
     </p:spTree>
     <p:extLst>
       <p:ext uri="{BB962C8B-B14F-4D97-AF65-F5344CB8AC3E}">
@@ -3752,8 +4078,8 @@
         </p:nvSpPr>
         <p:spPr>
           <a:xfrm>
-            <a:off x="0" y="0"/>
-            <a:ext cx="10515600" cy="544356"/>
+            <a:off x="-1" y="-104932"/>
+            <a:ext cx="10837889" cy="970501"/>
           </a:xfrm>
         </p:spPr>
         <p:txBody>
@@ -3767,15 +4093,170 @@
                 <a:latin typeface="Arial" panose="020B0604020202020204" pitchFamily="34" charset="0"/>
                 <a:cs typeface="Arial" panose="020B0604020202020204" pitchFamily="34" charset="0"/>
               </a:rPr>
-              <a:t>ANB2 Second Threshold Aligned Movements</a:t>
-            </a:r>
-          </a:p>
-        </p:txBody>
-      </p:sp>
+              <a:t>Normalized total jerk (jerk ratio) from first threshold to peak of </a:t>
+            </a:r>
+            <a:r>
+              <a:rPr lang="en-US" sz="2400" b="1" dirty="0" err="1">
+                <a:latin typeface="Arial" panose="020B0604020202020204" pitchFamily="34" charset="0"/>
+                <a:cs typeface="Arial" panose="020B0604020202020204" pitchFamily="34" charset="0"/>
+              </a:rPr>
+              <a:t>leverpress</a:t>
+            </a:r>
+            <a:endParaRPr lang="en-US" sz="2400" b="1" dirty="0">
+              <a:latin typeface="Arial" panose="020B0604020202020204" pitchFamily="34" charset="0"/>
+              <a:cs typeface="Arial" panose="020B0604020202020204" pitchFamily="34" charset="0"/>
+            </a:endParaRPr>
+          </a:p>
+        </p:txBody>
+      </p:sp>
+      <p:sp>
+        <p:nvSpPr>
+          <p:cNvPr id="16" name="Title 1">
+            <a:extLst>
+              <a:ext uri="{FF2B5EF4-FFF2-40B4-BE49-F238E27FC236}">
+                <a16:creationId xmlns:a16="http://schemas.microsoft.com/office/drawing/2014/main" id="{D4D69070-78C9-DDDC-4D5A-A2249931E019}"/>
+              </a:ext>
+            </a:extLst>
+          </p:cNvPr>
+          <p:cNvSpPr txBox="1">
+            <a:spLocks/>
+          </p:cNvSpPr>
+          <p:nvPr/>
+        </p:nvSpPr>
+        <p:spPr>
+          <a:xfrm>
+            <a:off x="281118" y="1690507"/>
+            <a:ext cx="1603948" cy="970501"/>
+          </a:xfrm>
+          <a:prstGeom prst="rect">
+            <a:avLst/>
+          </a:prstGeom>
+        </p:spPr>
+        <p:txBody>
+          <a:bodyPr vert="horz" lIns="91440" tIns="45720" rIns="91440" bIns="45720" rtlCol="0" anchor="ctr">
+            <a:normAutofit/>
+          </a:bodyPr>
+          <a:lstStyle>
+            <a:lvl1pPr algn="l" defTabSz="914400" rtl="0" eaLnBrk="1" latinLnBrk="0" hangingPunct="1">
+              <a:lnSpc>
+                <a:spcPct val="90000"/>
+              </a:lnSpc>
+              <a:spcBef>
+                <a:spcPct val="0"/>
+              </a:spcBef>
+              <a:buNone/>
+              <a:defRPr sz="4400" kern="1200">
+                <a:solidFill>
+                  <a:schemeClr val="tx1"/>
+                </a:solidFill>
+                <a:latin typeface="+mj-lt"/>
+                <a:ea typeface="+mj-ea"/>
+                <a:cs typeface="+mj-cs"/>
+              </a:defRPr>
+            </a:lvl1pPr>
+          </a:lstStyle>
+          <a:p>
+            <a:r>
+              <a:rPr lang="en-US" sz="2400" b="1" dirty="0">
+                <a:latin typeface="Arial" panose="020B0604020202020204" pitchFamily="34" charset="0"/>
+                <a:cs typeface="Arial" panose="020B0604020202020204" pitchFamily="34" charset="0"/>
+              </a:rPr>
+              <a:t>ANM7</a:t>
+            </a:r>
+          </a:p>
+        </p:txBody>
+      </p:sp>
+      <p:sp>
+        <p:nvSpPr>
+          <p:cNvPr id="17" name="Title 1">
+            <a:extLst>
+              <a:ext uri="{FF2B5EF4-FFF2-40B4-BE49-F238E27FC236}">
+                <a16:creationId xmlns:a16="http://schemas.microsoft.com/office/drawing/2014/main" id="{FF253B23-5EBF-A342-9B69-A05A2FBD3385}"/>
+              </a:ext>
+            </a:extLst>
+          </p:cNvPr>
+          <p:cNvSpPr txBox="1">
+            <a:spLocks/>
+          </p:cNvSpPr>
+          <p:nvPr/>
+        </p:nvSpPr>
+        <p:spPr>
+          <a:xfrm>
+            <a:off x="112511" y="4114056"/>
+            <a:ext cx="1603948" cy="970501"/>
+          </a:xfrm>
+          <a:prstGeom prst="rect">
+            <a:avLst/>
+          </a:prstGeom>
+        </p:spPr>
+        <p:txBody>
+          <a:bodyPr vert="horz" lIns="91440" tIns="45720" rIns="91440" bIns="45720" rtlCol="0" anchor="ctr">
+            <a:normAutofit/>
+          </a:bodyPr>
+          <a:lstStyle>
+            <a:lvl1pPr algn="l" defTabSz="914400" rtl="0" eaLnBrk="1" latinLnBrk="0" hangingPunct="1">
+              <a:lnSpc>
+                <a:spcPct val="90000"/>
+              </a:lnSpc>
+              <a:spcBef>
+                <a:spcPct val="0"/>
+              </a:spcBef>
+              <a:buNone/>
+              <a:defRPr sz="4400" kern="1200">
+                <a:solidFill>
+                  <a:schemeClr val="tx1"/>
+                </a:solidFill>
+                <a:latin typeface="+mj-lt"/>
+                <a:ea typeface="+mj-ea"/>
+                <a:cs typeface="+mj-cs"/>
+              </a:defRPr>
+            </a:lvl1pPr>
+          </a:lstStyle>
+          <a:p>
+            <a:r>
+              <a:rPr lang="en-US" sz="2400" b="1" dirty="0">
+                <a:latin typeface="Arial" panose="020B0604020202020204" pitchFamily="34" charset="0"/>
+                <a:cs typeface="Arial" panose="020B0604020202020204" pitchFamily="34" charset="0"/>
+              </a:rPr>
+              <a:t>ANA2</a:t>
+            </a:r>
+          </a:p>
+        </p:txBody>
+      </p:sp>
+      <p:pic>
+        <p:nvPicPr>
+          <p:cNvPr id="3" name="Picture 2">
+            <a:extLst>
+              <a:ext uri="{FF2B5EF4-FFF2-40B4-BE49-F238E27FC236}">
+                <a16:creationId xmlns:a16="http://schemas.microsoft.com/office/drawing/2014/main" id="{0D3C744D-6CCC-34E4-1F93-54A8BA9B5C0A}"/>
+              </a:ext>
+            </a:extLst>
+          </p:cNvPr>
+          <p:cNvPicPr>
+            <a:picLocks noChangeAspect="1"/>
+          </p:cNvPicPr>
+          <p:nvPr/>
+        </p:nvPicPr>
+        <p:blipFill>
+          <a:blip r:embed="rId2"/>
+          <a:stretch>
+            <a:fillRect/>
+          </a:stretch>
+        </p:blipFill>
+        <p:spPr>
+          <a:xfrm>
+            <a:off x="2249714" y="865569"/>
+            <a:ext cx="3022600" cy="2400300"/>
+          </a:xfrm>
+          <a:prstGeom prst="rect">
+            <a:avLst/>
+          </a:prstGeom>
+        </p:spPr>
+      </p:pic>
     </p:spTree>
     <p:extLst>
       <p:ext uri="{BB962C8B-B14F-4D97-AF65-F5344CB8AC3E}">
-        <p14:creationId xmlns:p14="http://schemas.microsoft.com/office/powerpoint/2010/main" val="3281332277"/>
+        <p14:creationId xmlns:p14="http://schemas.microsoft.com/office/powerpoint/2010/main" val="3999720457"/>
       </p:ext>
     </p:extLst>
   </p:cSld>
@@ -3856,10 +4337,10 @@
       </p:sp>
       <p:sp>
         <p:nvSpPr>
-          <p:cNvPr id="16" name="Title 1">
-            <a:extLst>
-              <a:ext uri="{FF2B5EF4-FFF2-40B4-BE49-F238E27FC236}">
-                <a16:creationId xmlns:a16="http://schemas.microsoft.com/office/drawing/2014/main" id="{D4D69070-78C9-DDDC-4D5A-A2249931E019}"/>
+          <p:cNvPr id="18" name="Title 1">
+            <a:extLst>
+              <a:ext uri="{FF2B5EF4-FFF2-40B4-BE49-F238E27FC236}">
+                <a16:creationId xmlns:a16="http://schemas.microsoft.com/office/drawing/2014/main" id="{55D98E7D-6E43-19D0-73F3-5C9A35F86521}"/>
               </a:ext>
             </a:extLst>
           </p:cNvPr>
@@ -3870,7 +4351,7 @@
         </p:nvSpPr>
         <p:spPr>
           <a:xfrm>
-            <a:off x="281118" y="1690507"/>
+            <a:off x="484616" y="1596206"/>
             <a:ext cx="1603948" cy="970501"/>
           </a:xfrm>
           <a:prstGeom prst="rect">
@@ -3906,17 +4387,17 @@
                 <a:latin typeface="Arial" panose="020B0604020202020204" pitchFamily="34" charset="0"/>
                 <a:cs typeface="Arial" panose="020B0604020202020204" pitchFamily="34" charset="0"/>
               </a:rPr>
-              <a:t>ANA1</a:t>
-            </a:r>
-          </a:p>
-        </p:txBody>
-      </p:sp>
-      <p:sp>
-        <p:nvSpPr>
-          <p:cNvPr id="17" name="Title 1">
-            <a:extLst>
-              <a:ext uri="{FF2B5EF4-FFF2-40B4-BE49-F238E27FC236}">
-                <a16:creationId xmlns:a16="http://schemas.microsoft.com/office/drawing/2014/main" id="{FF253B23-5EBF-A342-9B69-A05A2FBD3385}"/>
+              <a:t>ANB1</a:t>
+            </a:r>
+          </a:p>
+        </p:txBody>
+      </p:sp>
+      <p:sp>
+        <p:nvSpPr>
+          <p:cNvPr id="19" name="Title 1">
+            <a:extLst>
+              <a:ext uri="{FF2B5EF4-FFF2-40B4-BE49-F238E27FC236}">
+                <a16:creationId xmlns:a16="http://schemas.microsoft.com/office/drawing/2014/main" id="{DFF1D5B2-E34C-1007-51A4-25C40131E1A4}"/>
               </a:ext>
             </a:extLst>
           </p:cNvPr>
@@ -3927,7 +4408,7 @@
         </p:nvSpPr>
         <p:spPr>
           <a:xfrm>
-            <a:off x="112511" y="4114056"/>
+            <a:off x="484616" y="5628312"/>
             <a:ext cx="1603948" cy="970501"/>
           </a:xfrm>
           <a:prstGeom prst="rect">
@@ -3963,15 +4444,105 @@
                 <a:latin typeface="Arial" panose="020B0604020202020204" pitchFamily="34" charset="0"/>
                 <a:cs typeface="Arial" panose="020B0604020202020204" pitchFamily="34" charset="0"/>
               </a:rPr>
-              <a:t>ANA2</a:t>
-            </a:r>
-          </a:p>
-        </p:txBody>
-      </p:sp>
+              <a:t>ANB2</a:t>
+            </a:r>
+          </a:p>
+        </p:txBody>
+      </p:sp>
+      <p:pic>
+        <p:nvPicPr>
+          <p:cNvPr id="7" name="Picture 6">
+            <a:extLst>
+              <a:ext uri="{FF2B5EF4-FFF2-40B4-BE49-F238E27FC236}">
+                <a16:creationId xmlns:a16="http://schemas.microsoft.com/office/drawing/2014/main" id="{047E3B3C-3606-1272-F20F-7B9BA76391DC}"/>
+              </a:ext>
+            </a:extLst>
+          </p:cNvPr>
+          <p:cNvPicPr>
+            <a:picLocks noChangeAspect="1"/>
+          </p:cNvPicPr>
+          <p:nvPr/>
+        </p:nvPicPr>
+        <p:blipFill>
+          <a:blip r:embed="rId2"/>
+          <a:stretch>
+            <a:fillRect/>
+          </a:stretch>
+        </p:blipFill>
+        <p:spPr>
+          <a:xfrm>
+            <a:off x="2235884" y="4581583"/>
+            <a:ext cx="2264075" cy="1797942"/>
+          </a:xfrm>
+          <a:prstGeom prst="rect">
+            <a:avLst/>
+          </a:prstGeom>
+        </p:spPr>
+      </p:pic>
+      <p:pic>
+        <p:nvPicPr>
+          <p:cNvPr id="8" name="Picture 7">
+            <a:extLst>
+              <a:ext uri="{FF2B5EF4-FFF2-40B4-BE49-F238E27FC236}">
+                <a16:creationId xmlns:a16="http://schemas.microsoft.com/office/drawing/2014/main" id="{B12695C4-C7D7-F33C-E49E-86CAE90FCAB8}"/>
+              </a:ext>
+            </a:extLst>
+          </p:cNvPr>
+          <p:cNvPicPr>
+            <a:picLocks noChangeAspect="1"/>
+          </p:cNvPicPr>
+          <p:nvPr/>
+        </p:nvPicPr>
+        <p:blipFill>
+          <a:blip r:embed="rId3"/>
+          <a:stretch>
+            <a:fillRect/>
+          </a:stretch>
+        </p:blipFill>
+        <p:spPr>
+          <a:xfrm>
+            <a:off x="5427968" y="4615457"/>
+            <a:ext cx="2264075" cy="1797942"/>
+          </a:xfrm>
+          <a:prstGeom prst="rect">
+            <a:avLst/>
+          </a:prstGeom>
+        </p:spPr>
+      </p:pic>
+      <p:pic>
+        <p:nvPicPr>
+          <p:cNvPr id="9" name="Picture 8">
+            <a:extLst>
+              <a:ext uri="{FF2B5EF4-FFF2-40B4-BE49-F238E27FC236}">
+                <a16:creationId xmlns:a16="http://schemas.microsoft.com/office/drawing/2014/main" id="{F3A0EF95-47D7-57AE-DD9D-A85F6AA22CC2}"/>
+              </a:ext>
+            </a:extLst>
+          </p:cNvPr>
+          <p:cNvPicPr>
+            <a:picLocks noChangeAspect="1"/>
+          </p:cNvPicPr>
+          <p:nvPr/>
+        </p:nvPicPr>
+        <p:blipFill>
+          <a:blip r:embed="rId4"/>
+          <a:stretch>
+            <a:fillRect/>
+          </a:stretch>
+        </p:blipFill>
+        <p:spPr>
+          <a:xfrm>
+            <a:off x="8962179" y="4800871"/>
+            <a:ext cx="2264075" cy="1797942"/>
+          </a:xfrm>
+          <a:prstGeom prst="rect">
+            <a:avLst/>
+          </a:prstGeom>
+        </p:spPr>
+      </p:pic>
     </p:spTree>
     <p:extLst>
       <p:ext uri="{BB962C8B-B14F-4D97-AF65-F5344CB8AC3E}">
-        <p14:creationId xmlns:p14="http://schemas.microsoft.com/office/powerpoint/2010/main" val="3999720457"/>
+        <p14:creationId xmlns:p14="http://schemas.microsoft.com/office/powerpoint/2010/main" val="2321486125"/>
       </p:ext>
     </p:extLst>
   </p:cSld>
@@ -4016,7 +4587,7 @@
         </p:nvSpPr>
         <p:spPr>
           <a:xfrm>
-            <a:off x="-1" y="-104932"/>
+            <a:off x="-1" y="104928"/>
             <a:ext cx="10837889" cy="970501"/>
           </a:xfrm>
         </p:spPr>
@@ -4052,212 +4623,57 @@
       </p:sp>
       <p:sp>
         <p:nvSpPr>
-          <p:cNvPr id="18" name="Title 1">
-            <a:extLst>
-              <a:ext uri="{FF2B5EF4-FFF2-40B4-BE49-F238E27FC236}">
-                <a16:creationId xmlns:a16="http://schemas.microsoft.com/office/drawing/2014/main" id="{55D98E7D-6E43-19D0-73F3-5C9A35F86521}"/>
-              </a:ext>
-            </a:extLst>
-          </p:cNvPr>
-          <p:cNvSpPr txBox="1">
-            <a:spLocks/>
-          </p:cNvSpPr>
+          <p:cNvPr id="4" name="TextBox 3">
+            <a:extLst>
+              <a:ext uri="{FF2B5EF4-FFF2-40B4-BE49-F238E27FC236}">
+                <a16:creationId xmlns:a16="http://schemas.microsoft.com/office/drawing/2014/main" id="{9BBF4307-E7B1-D62D-995A-F67A14A17187}"/>
+              </a:ext>
+            </a:extLst>
+          </p:cNvPr>
+          <p:cNvSpPr txBox="1"/>
           <p:nvPr/>
         </p:nvSpPr>
         <p:spPr>
           <a:xfrm>
-            <a:off x="484616" y="1596206"/>
-            <a:ext cx="1603948" cy="970501"/>
+            <a:off x="3291615" y="6202360"/>
+            <a:ext cx="8900385" cy="646331"/>
           </a:xfrm>
           <a:prstGeom prst="rect">
             <a:avLst/>
           </a:prstGeom>
-        </p:spPr>
-        <p:txBody>
-          <a:bodyPr vert="horz" lIns="91440" tIns="45720" rIns="91440" bIns="45720" rtlCol="0" anchor="ctr">
-            <a:normAutofit/>
+          <a:noFill/>
+        </p:spPr>
+        <p:txBody>
+          <a:bodyPr wrap="none" rtlCol="0">
+            <a:spAutoFit/>
           </a:bodyPr>
-          <a:lstStyle>
-            <a:lvl1pPr algn="l" defTabSz="914400" rtl="0" eaLnBrk="1" latinLnBrk="0" hangingPunct="1">
-              <a:lnSpc>
-                <a:spcPct val="90000"/>
-              </a:lnSpc>
-              <a:spcBef>
-                <a:spcPct val="0"/>
-              </a:spcBef>
-              <a:buNone/>
-              <a:defRPr sz="4400" kern="1200">
-                <a:solidFill>
-                  <a:schemeClr val="tx1"/>
-                </a:solidFill>
-                <a:latin typeface="+mj-lt"/>
-                <a:ea typeface="+mj-ea"/>
-                <a:cs typeface="+mj-cs"/>
-              </a:defRPr>
-            </a:lvl1pPr>
-          </a:lstStyle>
-          <a:p>
-            <a:r>
-              <a:rPr lang="en-US" sz="2400" b="1" dirty="0">
-                <a:latin typeface="Arial" panose="020B0604020202020204" pitchFamily="34" charset="0"/>
-                <a:cs typeface="Arial" panose="020B0604020202020204" pitchFamily="34" charset="0"/>
-              </a:rPr>
-              <a:t>ANB1</a:t>
-            </a:r>
-          </a:p>
-        </p:txBody>
-      </p:sp>
-      <p:sp>
-        <p:nvSpPr>
-          <p:cNvPr id="19" name="Title 1">
-            <a:extLst>
-              <a:ext uri="{FF2B5EF4-FFF2-40B4-BE49-F238E27FC236}">
-                <a16:creationId xmlns:a16="http://schemas.microsoft.com/office/drawing/2014/main" id="{DFF1D5B2-E34C-1007-51A4-25C40131E1A4}"/>
-              </a:ext>
-            </a:extLst>
-          </p:cNvPr>
-          <p:cNvSpPr txBox="1">
-            <a:spLocks/>
-          </p:cNvSpPr>
-          <p:nvPr/>
-        </p:nvSpPr>
-        <p:spPr>
-          <a:xfrm>
-            <a:off x="484616" y="5628312"/>
-            <a:ext cx="1603948" cy="970501"/>
-          </a:xfrm>
-          <a:prstGeom prst="rect">
-            <a:avLst/>
-          </a:prstGeom>
-        </p:spPr>
-        <p:txBody>
-          <a:bodyPr vert="horz" lIns="91440" tIns="45720" rIns="91440" bIns="45720" rtlCol="0" anchor="ctr">
-            <a:normAutofit/>
-          </a:bodyPr>
-          <a:lstStyle>
-            <a:lvl1pPr algn="l" defTabSz="914400" rtl="0" eaLnBrk="1" latinLnBrk="0" hangingPunct="1">
-              <a:lnSpc>
-                <a:spcPct val="90000"/>
-              </a:lnSpc>
-              <a:spcBef>
-                <a:spcPct val="0"/>
-              </a:spcBef>
-              <a:buNone/>
-              <a:defRPr sz="4400" kern="1200">
-                <a:solidFill>
-                  <a:schemeClr val="tx1"/>
-                </a:solidFill>
-                <a:latin typeface="+mj-lt"/>
-                <a:ea typeface="+mj-ea"/>
-                <a:cs typeface="+mj-cs"/>
-              </a:defRPr>
-            </a:lvl1pPr>
-          </a:lstStyle>
-          <a:p>
-            <a:r>
-              <a:rPr lang="en-US" sz="2400" b="1" dirty="0">
-                <a:latin typeface="Arial" panose="020B0604020202020204" pitchFamily="34" charset="0"/>
-                <a:cs typeface="Arial" panose="020B0604020202020204" pitchFamily="34" charset="0"/>
-              </a:rPr>
-              <a:t>ANB2</a:t>
-            </a:r>
-          </a:p>
-        </p:txBody>
-      </p:sp>
-      <p:pic>
-        <p:nvPicPr>
-          <p:cNvPr id="7" name="Picture 6">
-            <a:extLst>
-              <a:ext uri="{FF2B5EF4-FFF2-40B4-BE49-F238E27FC236}">
-                <a16:creationId xmlns:a16="http://schemas.microsoft.com/office/drawing/2014/main" id="{047E3B3C-3606-1272-F20F-7B9BA76391DC}"/>
-              </a:ext>
-            </a:extLst>
-          </p:cNvPr>
-          <p:cNvPicPr>
-            <a:picLocks noChangeAspect="1"/>
-          </p:cNvPicPr>
-          <p:nvPr/>
-        </p:nvPicPr>
-        <p:blipFill>
-          <a:blip r:embed="rId2"/>
-          <a:stretch>
-            <a:fillRect/>
-          </a:stretch>
-        </p:blipFill>
-        <p:spPr>
-          <a:xfrm>
-            <a:off x="2235884" y="4581583"/>
-            <a:ext cx="2264075" cy="1797942"/>
-          </a:xfrm>
-          <a:prstGeom prst="rect">
-            <a:avLst/>
-          </a:prstGeom>
-        </p:spPr>
-      </p:pic>
-      <p:pic>
-        <p:nvPicPr>
-          <p:cNvPr id="8" name="Picture 7">
-            <a:extLst>
-              <a:ext uri="{FF2B5EF4-FFF2-40B4-BE49-F238E27FC236}">
-                <a16:creationId xmlns:a16="http://schemas.microsoft.com/office/drawing/2014/main" id="{B12695C4-C7D7-F33C-E49E-86CAE90FCAB8}"/>
-              </a:ext>
-            </a:extLst>
-          </p:cNvPr>
-          <p:cNvPicPr>
-            <a:picLocks noChangeAspect="1"/>
-          </p:cNvPicPr>
-          <p:nvPr/>
-        </p:nvPicPr>
-        <p:blipFill>
-          <a:blip r:embed="rId3"/>
-          <a:stretch>
-            <a:fillRect/>
-          </a:stretch>
-        </p:blipFill>
-        <p:spPr>
-          <a:xfrm>
-            <a:off x="5427968" y="4615457"/>
-            <a:ext cx="2264075" cy="1797942"/>
-          </a:xfrm>
-          <a:prstGeom prst="rect">
-            <a:avLst/>
-          </a:prstGeom>
-        </p:spPr>
-      </p:pic>
-      <p:pic>
-        <p:nvPicPr>
-          <p:cNvPr id="9" name="Picture 8">
-            <a:extLst>
-              <a:ext uri="{FF2B5EF4-FFF2-40B4-BE49-F238E27FC236}">
-                <a16:creationId xmlns:a16="http://schemas.microsoft.com/office/drawing/2014/main" id="{F3A0EF95-47D7-57AE-DD9D-A85F6AA22CC2}"/>
-              </a:ext>
-            </a:extLst>
-          </p:cNvPr>
-          <p:cNvPicPr>
-            <a:picLocks noChangeAspect="1"/>
-          </p:cNvPicPr>
-          <p:nvPr/>
-        </p:nvPicPr>
-        <p:blipFill>
-          <a:blip r:embed="rId4"/>
-          <a:stretch>
-            <a:fillRect/>
-          </a:stretch>
-        </p:blipFill>
-        <p:spPr>
-          <a:xfrm>
-            <a:off x="8962179" y="4800871"/>
-            <a:ext cx="2264075" cy="1797942"/>
-          </a:xfrm>
-          <a:prstGeom prst="rect">
-            <a:avLst/>
-          </a:prstGeom>
-        </p:spPr>
-      </p:pic>
+          <a:lstStyle/>
+          <a:p>
+            <a:r>
+              <a:rPr lang="en-US" dirty="0"/>
+              <a:t>Because data not ~N, plotting median +/- 95 </a:t>
+            </a:r>
+            <a:r>
+              <a:rPr lang="en-US" dirty="0" err="1"/>
+              <a:t>cdf</a:t>
+            </a:r>
+            <a:r>
+              <a:rPr lang="en-US" dirty="0"/>
+              <a:t> for now, but might go back to mean not sure</a:t>
+            </a:r>
+          </a:p>
+          <a:p>
+            <a:r>
+              <a:rPr lang="en-US" dirty="0"/>
+              <a:t>Yes, upper outliers are therefore cut off</a:t>
+            </a:r>
+          </a:p>
+        </p:txBody>
+      </p:sp>
     </p:spTree>
     <p:extLst>
       <p:ext uri="{BB962C8B-B14F-4D97-AF65-F5344CB8AC3E}">
-        <p14:creationId xmlns:p14="http://schemas.microsoft.com/office/powerpoint/2010/main" val="2321486125"/>
+        <p14:creationId xmlns:p14="http://schemas.microsoft.com/office/powerpoint/2010/main" val="3990869466"/>
       </p:ext>
     </p:extLst>
   </p:cSld>
@@ -4302,8 +4718,8 @@
         </p:nvSpPr>
         <p:spPr>
           <a:xfrm>
-            <a:off x="-1" y="104928"/>
-            <a:ext cx="10837889" cy="970501"/>
+            <a:off x="0" y="0"/>
+            <a:ext cx="10515600" cy="544356"/>
           </a:xfrm>
         </p:spPr>
         <p:txBody>
@@ -4317,70 +4733,7 @@
                 <a:latin typeface="Arial" panose="020B0604020202020204" pitchFamily="34" charset="0"/>
                 <a:cs typeface="Arial" panose="020B0604020202020204" pitchFamily="34" charset="0"/>
               </a:rPr>
-              <a:t>Normalized total jerk (jerk ratio) from first threshold to peak of </a:t>
-            </a:r>
-            <a:r>
-              <a:rPr lang="en-US" sz="2400" b="1" dirty="0" err="1">
-                <a:latin typeface="Arial" panose="020B0604020202020204" pitchFamily="34" charset="0"/>
-                <a:cs typeface="Arial" panose="020B0604020202020204" pitchFamily="34" charset="0"/>
-              </a:rPr>
-              <a:t>leverpress</a:t>
-            </a:r>
-            <a:r>
-              <a:rPr lang="en-US" sz="2400" b="1" dirty="0">
-                <a:latin typeface="Arial" panose="020B0604020202020204" pitchFamily="34" charset="0"/>
-                <a:cs typeface="Arial" panose="020B0604020202020204" pitchFamily="34" charset="0"/>
-              </a:rPr>
-              <a:t> (not full lever press right now because of weird electrical thing)</a:t>
-            </a:r>
-          </a:p>
-        </p:txBody>
-      </p:sp>
-      <p:sp>
-        <p:nvSpPr>
-          <p:cNvPr id="4" name="TextBox 3">
-            <a:extLst>
-              <a:ext uri="{FF2B5EF4-FFF2-40B4-BE49-F238E27FC236}">
-                <a16:creationId xmlns:a16="http://schemas.microsoft.com/office/drawing/2014/main" id="{9BBF4307-E7B1-D62D-995A-F67A14A17187}"/>
-              </a:ext>
-            </a:extLst>
-          </p:cNvPr>
-          <p:cNvSpPr txBox="1"/>
-          <p:nvPr/>
-        </p:nvSpPr>
-        <p:spPr>
-          <a:xfrm>
-            <a:off x="3291615" y="6202360"/>
-            <a:ext cx="8900385" cy="646331"/>
-          </a:xfrm>
-          <a:prstGeom prst="rect">
-            <a:avLst/>
-          </a:prstGeom>
-          <a:noFill/>
-        </p:spPr>
-        <p:txBody>
-          <a:bodyPr wrap="none" rtlCol="0">
-            <a:spAutoFit/>
-          </a:bodyPr>
-          <a:lstStyle/>
-          <a:p>
-            <a:r>
-              <a:rPr lang="en-US" dirty="0"/>
-              <a:t>Because data not ~N, plotting median +/- 95 </a:t>
-            </a:r>
-            <a:r>
-              <a:rPr lang="en-US" dirty="0" err="1"/>
-              <a:t>cdf</a:t>
-            </a:r>
-            <a:r>
-              <a:rPr lang="en-US" dirty="0"/>
-              <a:t> for now, but might go back to mean not sure</a:t>
-            </a:r>
-          </a:p>
-          <a:p>
-            <a:r>
-              <a:rPr lang="en-US" dirty="0"/>
-              <a:t>Yes, upper outliers are therefore cut off</a:t>
+              <a:t>Temporal compression of the movement?</a:t>
             </a:r>
           </a:p>
         </p:txBody>
@@ -4388,7 +4741,7 @@
     </p:spTree>
     <p:extLst>
       <p:ext uri="{BB962C8B-B14F-4D97-AF65-F5344CB8AC3E}">
-        <p14:creationId xmlns:p14="http://schemas.microsoft.com/office/powerpoint/2010/main" val="3990869466"/>
+        <p14:creationId xmlns:p14="http://schemas.microsoft.com/office/powerpoint/2010/main" val="3532051170"/>
       </p:ext>
     </p:extLst>
   </p:cSld>
@@ -4448,7 +4801,7 @@
                 <a:latin typeface="Arial" panose="020B0604020202020204" pitchFamily="34" charset="0"/>
                 <a:cs typeface="Arial" panose="020B0604020202020204" pitchFamily="34" charset="0"/>
               </a:rPr>
-              <a:t>Temporal compression of the movement?</a:t>
+              <a:t>Reaction times</a:t>
             </a:r>
           </a:p>
         </p:txBody>
@@ -4456,7 +4809,7 @@
     </p:spTree>
     <p:extLst>
       <p:ext uri="{BB962C8B-B14F-4D97-AF65-F5344CB8AC3E}">
-        <p14:creationId xmlns:p14="http://schemas.microsoft.com/office/powerpoint/2010/main" val="3532051170"/>
+        <p14:creationId xmlns:p14="http://schemas.microsoft.com/office/powerpoint/2010/main" val="3037425040"/>
       </p:ext>
     </p:extLst>
   </p:cSld>

</xml_diff>

<commit_message>
align to first threshold and do jerk and search down first the nup
</commit_message>
<xml_diff>
--- a/presentations_and_figures/240205.pptx
+++ b/presentations_and_figures/240205.pptx
@@ -11,9 +11,10 @@
     <p:sldId id="283" r:id="rId5"/>
     <p:sldId id="287" r:id="rId6"/>
     <p:sldId id="289" r:id="rId7"/>
-    <p:sldId id="288" r:id="rId8"/>
-    <p:sldId id="285" r:id="rId9"/>
-    <p:sldId id="286" r:id="rId10"/>
+    <p:sldId id="290" r:id="rId8"/>
+    <p:sldId id="288" r:id="rId9"/>
+    <p:sldId id="285" r:id="rId10"/>
+    <p:sldId id="286" r:id="rId11"/>
   </p:sldIdLst>
   <p:sldSz cx="12192000" cy="6858000"/>
   <p:notesSz cx="6858000" cy="9144000"/>
@@ -267,7 +268,7 @@
           <a:p>
             <a:fld id="{DB3D4718-F915-004B-9F09-68AAF001912E}" type="datetimeFigureOut">
               <a:rPr lang="en-US" smtClean="0"/>
-              <a:t>2/5/24</a:t>
+              <a:t>2/6/24</a:t>
             </a:fld>
             <a:endParaRPr lang="en-US"/>
           </a:p>
@@ -465,7 +466,7 @@
           <a:p>
             <a:fld id="{DB3D4718-F915-004B-9F09-68AAF001912E}" type="datetimeFigureOut">
               <a:rPr lang="en-US" smtClean="0"/>
-              <a:t>2/5/24</a:t>
+              <a:t>2/6/24</a:t>
             </a:fld>
             <a:endParaRPr lang="en-US"/>
           </a:p>
@@ -673,7 +674,7 @@
           <a:p>
             <a:fld id="{DB3D4718-F915-004B-9F09-68AAF001912E}" type="datetimeFigureOut">
               <a:rPr lang="en-US" smtClean="0"/>
-              <a:t>2/5/24</a:t>
+              <a:t>2/6/24</a:t>
             </a:fld>
             <a:endParaRPr lang="en-US"/>
           </a:p>
@@ -871,7 +872,7 @@
           <a:p>
             <a:fld id="{DB3D4718-F915-004B-9F09-68AAF001912E}" type="datetimeFigureOut">
               <a:rPr lang="en-US" smtClean="0"/>
-              <a:t>2/5/24</a:t>
+              <a:t>2/6/24</a:t>
             </a:fld>
             <a:endParaRPr lang="en-US"/>
           </a:p>
@@ -1146,7 +1147,7 @@
           <a:p>
             <a:fld id="{DB3D4718-F915-004B-9F09-68AAF001912E}" type="datetimeFigureOut">
               <a:rPr lang="en-US" smtClean="0"/>
-              <a:t>2/5/24</a:t>
+              <a:t>2/6/24</a:t>
             </a:fld>
             <a:endParaRPr lang="en-US"/>
           </a:p>
@@ -1411,7 +1412,7 @@
           <a:p>
             <a:fld id="{DB3D4718-F915-004B-9F09-68AAF001912E}" type="datetimeFigureOut">
               <a:rPr lang="en-US" smtClean="0"/>
-              <a:t>2/5/24</a:t>
+              <a:t>2/6/24</a:t>
             </a:fld>
             <a:endParaRPr lang="en-US"/>
           </a:p>
@@ -1823,7 +1824,7 @@
           <a:p>
             <a:fld id="{DB3D4718-F915-004B-9F09-68AAF001912E}" type="datetimeFigureOut">
               <a:rPr lang="en-US" smtClean="0"/>
-              <a:t>2/5/24</a:t>
+              <a:t>2/6/24</a:t>
             </a:fld>
             <a:endParaRPr lang="en-US"/>
           </a:p>
@@ -1964,7 +1965,7 @@
           <a:p>
             <a:fld id="{DB3D4718-F915-004B-9F09-68AAF001912E}" type="datetimeFigureOut">
               <a:rPr lang="en-US" smtClean="0"/>
-              <a:t>2/5/24</a:t>
+              <a:t>2/6/24</a:t>
             </a:fld>
             <a:endParaRPr lang="en-US"/>
           </a:p>
@@ -2077,7 +2078,7 @@
           <a:p>
             <a:fld id="{DB3D4718-F915-004B-9F09-68AAF001912E}" type="datetimeFigureOut">
               <a:rPr lang="en-US" smtClean="0"/>
-              <a:t>2/5/24</a:t>
+              <a:t>2/6/24</a:t>
             </a:fld>
             <a:endParaRPr lang="en-US"/>
           </a:p>
@@ -2388,7 +2389,7 @@
           <a:p>
             <a:fld id="{DB3D4718-F915-004B-9F09-68AAF001912E}" type="datetimeFigureOut">
               <a:rPr lang="en-US" smtClean="0"/>
-              <a:t>2/5/24</a:t>
+              <a:t>2/6/24</a:t>
             </a:fld>
             <a:endParaRPr lang="en-US"/>
           </a:p>
@@ -2676,7 +2677,7 @@
           <a:p>
             <a:fld id="{DB3D4718-F915-004B-9F09-68AAF001912E}" type="datetimeFigureOut">
               <a:rPr lang="en-US" smtClean="0"/>
-              <a:t>2/5/24</a:t>
+              <a:t>2/6/24</a:t>
             </a:fld>
             <a:endParaRPr lang="en-US"/>
           </a:p>
@@ -2917,7 +2918,7 @@
           <a:p>
             <a:fld id="{DB3D4718-F915-004B-9F09-68AAF001912E}" type="datetimeFigureOut">
               <a:rPr lang="en-US" smtClean="0"/>
-              <a:t>2/5/24</a:t>
+              <a:t>2/6/24</a:t>
             </a:fld>
             <a:endParaRPr lang="en-US"/>
           </a:p>
@@ -3409,6 +3410,74 @@
 </p:sld>
 </file>
 
+<file path=ppt/slides/slide10.xml><?xml version="1.0" encoding="utf-8"?>
+<p:sld xmlns:a="http://schemas.openxmlformats.org/drawingml/2006/main" xmlns:r="http://schemas.openxmlformats.org/officeDocument/2006/relationships" xmlns:p="http://schemas.openxmlformats.org/presentationml/2006/main">
+  <p:cSld>
+    <p:spTree>
+      <p:nvGrpSpPr>
+        <p:cNvPr id="1" name=""/>
+        <p:cNvGrpSpPr/>
+        <p:nvPr/>
+      </p:nvGrpSpPr>
+      <p:grpSpPr>
+        <a:xfrm>
+          <a:off x="0" y="0"/>
+          <a:ext cx="0" cy="0"/>
+          <a:chOff x="0" y="0"/>
+          <a:chExt cx="0" cy="0"/>
+        </a:xfrm>
+      </p:grpSpPr>
+      <p:sp>
+        <p:nvSpPr>
+          <p:cNvPr id="2" name="Title 1">
+            <a:extLst>
+              <a:ext uri="{FF2B5EF4-FFF2-40B4-BE49-F238E27FC236}">
+                <a16:creationId xmlns:a16="http://schemas.microsoft.com/office/drawing/2014/main" id="{C84FA0E9-798D-DF27-7233-6D95D2E2DEC8}"/>
+              </a:ext>
+            </a:extLst>
+          </p:cNvPr>
+          <p:cNvSpPr>
+            <a:spLocks noGrp="1"/>
+          </p:cNvSpPr>
+          <p:nvPr>
+            <p:ph type="title"/>
+          </p:nvPr>
+        </p:nvSpPr>
+        <p:spPr>
+          <a:xfrm>
+            <a:off x="0" y="0"/>
+            <a:ext cx="10515600" cy="544356"/>
+          </a:xfrm>
+        </p:spPr>
+        <p:txBody>
+          <a:bodyPr>
+            <a:normAutofit/>
+          </a:bodyPr>
+          <a:lstStyle/>
+          <a:p>
+            <a:r>
+              <a:rPr lang="en-US" sz="2400" b="1" dirty="0">
+                <a:latin typeface="Arial" panose="020B0604020202020204" pitchFamily="34" charset="0"/>
+                <a:cs typeface="Arial" panose="020B0604020202020204" pitchFamily="34" charset="0"/>
+              </a:rPr>
+              <a:t>Reaction times</a:t>
+            </a:r>
+          </a:p>
+        </p:txBody>
+      </p:sp>
+    </p:spTree>
+    <p:extLst>
+      <p:ext uri="{BB962C8B-B14F-4D97-AF65-F5344CB8AC3E}">
+        <p14:creationId xmlns:p14="http://schemas.microsoft.com/office/powerpoint/2010/main" val="3037425040"/>
+      </p:ext>
+    </p:extLst>
+  </p:cSld>
+  <p:clrMapOvr>
+    <a:masterClrMapping/>
+  </p:clrMapOvr>
+</p:sld>
+</file>
+
 <file path=ppt/slides/slide2.xml><?xml version="1.0" encoding="utf-8"?>
 <p:sld xmlns:a="http://schemas.openxmlformats.org/drawingml/2006/main" xmlns:r="http://schemas.openxmlformats.org/officeDocument/2006/relationships" xmlns:p="http://schemas.openxmlformats.org/presentationml/2006/main">
   <p:cSld>
@@ -3466,10 +3535,10 @@
       </p:sp>
       <p:pic>
         <p:nvPicPr>
-          <p:cNvPr id="3" name="Picture 2">
-            <a:extLst>
-              <a:ext uri="{FF2B5EF4-FFF2-40B4-BE49-F238E27FC236}">
-                <a16:creationId xmlns:a16="http://schemas.microsoft.com/office/drawing/2014/main" id="{B9769111-2DCF-B011-2345-BDC1E2331DEE}"/>
+          <p:cNvPr id="8" name="Picture 7">
+            <a:extLst>
+              <a:ext uri="{FF2B5EF4-FFF2-40B4-BE49-F238E27FC236}">
+                <a16:creationId xmlns:a16="http://schemas.microsoft.com/office/drawing/2014/main" id="{7E264F43-CD8C-73A3-79AF-ADD1D1B8F7EA}"/>
               </a:ext>
             </a:extLst>
           </p:cNvPr>
@@ -3486,8 +3555,8 @@
         </p:blipFill>
         <p:spPr>
           <a:xfrm>
-            <a:off x="8339958" y="691702"/>
-            <a:ext cx="3314700" cy="2400300"/>
+            <a:off x="8578380" y="350793"/>
+            <a:ext cx="3263900" cy="2400300"/>
           </a:xfrm>
           <a:prstGeom prst="rect">
             <a:avLst/>
@@ -3496,10 +3565,10 @@
       </p:pic>
       <p:pic>
         <p:nvPicPr>
-          <p:cNvPr id="4" name="Picture 3">
-            <a:extLst>
-              <a:ext uri="{FF2B5EF4-FFF2-40B4-BE49-F238E27FC236}">
-                <a16:creationId xmlns:a16="http://schemas.microsoft.com/office/drawing/2014/main" id="{7B0EC68C-EBBD-823C-FBAE-19FF526F56FD}"/>
+          <p:cNvPr id="9" name="Picture 8">
+            <a:extLst>
+              <a:ext uri="{FF2B5EF4-FFF2-40B4-BE49-F238E27FC236}">
+                <a16:creationId xmlns:a16="http://schemas.microsoft.com/office/drawing/2014/main" id="{35E9986A-25BA-E91E-D498-ED7D333BC927}"/>
               </a:ext>
             </a:extLst>
           </p:cNvPr>
@@ -3516,8 +3585,8 @@
         </p:blipFill>
         <p:spPr>
           <a:xfrm>
-            <a:off x="8244710" y="3667643"/>
-            <a:ext cx="3314700" cy="2400300"/>
+            <a:off x="8343947" y="2751093"/>
+            <a:ext cx="3340100" cy="2400300"/>
           </a:xfrm>
           <a:prstGeom prst="rect">
             <a:avLst/>
@@ -3526,10 +3595,10 @@
       </p:pic>
       <p:pic>
         <p:nvPicPr>
-          <p:cNvPr id="5" name="Picture 4">
-            <a:extLst>
-              <a:ext uri="{FF2B5EF4-FFF2-40B4-BE49-F238E27FC236}">
-                <a16:creationId xmlns:a16="http://schemas.microsoft.com/office/drawing/2014/main" id="{D80E4B0B-BE76-8DD8-0AD7-975C31E856CD}"/>
+          <p:cNvPr id="10" name="Picture 9">
+            <a:extLst>
+              <a:ext uri="{FF2B5EF4-FFF2-40B4-BE49-F238E27FC236}">
+                <a16:creationId xmlns:a16="http://schemas.microsoft.com/office/drawing/2014/main" id="{0DAFF075-164D-0D77-E525-828D19A53397}"/>
               </a:ext>
             </a:extLst>
           </p:cNvPr>
@@ -3546,8 +3615,8 @@
         </p:blipFill>
         <p:spPr>
           <a:xfrm>
-            <a:off x="128752" y="588848"/>
-            <a:ext cx="7772400" cy="2503154"/>
+            <a:off x="8480614" y="7997906"/>
+            <a:ext cx="3263900" cy="2400300"/>
           </a:xfrm>
           <a:prstGeom prst="rect">
             <a:avLst/>
@@ -3556,10 +3625,10 @@
       </p:pic>
       <p:pic>
         <p:nvPicPr>
-          <p:cNvPr id="6" name="Picture 5">
-            <a:extLst>
-              <a:ext uri="{FF2B5EF4-FFF2-40B4-BE49-F238E27FC236}">
-                <a16:creationId xmlns:a16="http://schemas.microsoft.com/office/drawing/2014/main" id="{B0C1B67A-5C1B-18F3-4EAE-C7129A548389}"/>
+          <p:cNvPr id="15" name="Picture 14">
+            <a:extLst>
+              <a:ext uri="{FF2B5EF4-FFF2-40B4-BE49-F238E27FC236}">
+                <a16:creationId xmlns:a16="http://schemas.microsoft.com/office/drawing/2014/main" id="{FD199AFC-B974-54FD-7D72-16C6528E2482}"/>
               </a:ext>
             </a:extLst>
           </p:cNvPr>
@@ -3576,7 +3645,7 @@
         </p:blipFill>
         <p:spPr>
           <a:xfrm>
-            <a:off x="128752" y="3564789"/>
+            <a:off x="311989" y="438678"/>
             <a:ext cx="7772400" cy="2503154"/>
           </a:xfrm>
           <a:prstGeom prst="rect">
@@ -3584,41 +3653,126 @@
           </a:prstGeom>
         </p:spPr>
       </p:pic>
-      <p:sp>
-        <p:nvSpPr>
-          <p:cNvPr id="7" name="TextBox 6">
-            <a:extLst>
-              <a:ext uri="{FF2B5EF4-FFF2-40B4-BE49-F238E27FC236}">
-                <a16:creationId xmlns:a16="http://schemas.microsoft.com/office/drawing/2014/main" id="{33DCA85C-CC0D-FD59-C01D-305E0B0FFD48}"/>
-              </a:ext>
-            </a:extLst>
-          </p:cNvPr>
-          <p:cNvSpPr txBox="1"/>
+      <p:pic>
+        <p:nvPicPr>
+          <p:cNvPr id="16" name="Picture 15">
+            <a:extLst>
+              <a:ext uri="{FF2B5EF4-FFF2-40B4-BE49-F238E27FC236}">
+                <a16:creationId xmlns:a16="http://schemas.microsoft.com/office/drawing/2014/main" id="{3CFD14D6-6954-A0F3-9847-7055A65572A0}"/>
+              </a:ext>
+            </a:extLst>
+          </p:cNvPr>
+          <p:cNvPicPr>
+            <a:picLocks noChangeAspect="1"/>
+          </p:cNvPicPr>
           <p:nvPr/>
-        </p:nvSpPr>
-        <p:spPr>
-          <a:xfrm>
-            <a:off x="11842280" y="-201039"/>
-            <a:ext cx="3699575" cy="2585323"/>
+        </p:nvPicPr>
+        <p:blipFill>
+          <a:blip r:embed="rId6"/>
+          <a:stretch>
+            <a:fillRect/>
+          </a:stretch>
+        </p:blipFill>
+        <p:spPr>
+          <a:xfrm>
+            <a:off x="191487" y="3048793"/>
+            <a:ext cx="7772400" cy="2503154"/>
           </a:xfrm>
           <a:prstGeom prst="rect">
             <a:avLst/>
           </a:prstGeom>
-          <a:noFill/>
-        </p:spPr>
-        <p:txBody>
-          <a:bodyPr wrap="square" rtlCol="0">
-            <a:spAutoFit/>
-          </a:bodyPr>
-          <a:lstStyle/>
-          <a:p>
-            <a:r>
-              <a:rPr lang="en-US" dirty="0"/>
-              <a:t>From only 2 days, it problematically looks like mice are learning to keep the lever closer during the threshold calculation—I want to plot the voltage baseline across days at some point to make sure this isn’t the case (and avoid all of our analysis trends being due to higher baseline/thresholds)</a:t>
-            </a:r>
-          </a:p>
-        </p:txBody>
-      </p:sp>
+        </p:spPr>
+      </p:pic>
+      <p:pic>
+        <p:nvPicPr>
+          <p:cNvPr id="17" name="Picture 16">
+            <a:extLst>
+              <a:ext uri="{FF2B5EF4-FFF2-40B4-BE49-F238E27FC236}">
+                <a16:creationId xmlns:a16="http://schemas.microsoft.com/office/drawing/2014/main" id="{34B8DFEB-6B2F-1D3C-A7CC-D18F46006305}"/>
+              </a:ext>
+            </a:extLst>
+          </p:cNvPr>
+          <p:cNvPicPr>
+            <a:picLocks noChangeAspect="1"/>
+          </p:cNvPicPr>
+          <p:nvPr/>
+        </p:nvPicPr>
+        <p:blipFill>
+          <a:blip r:embed="rId7"/>
+          <a:stretch>
+            <a:fillRect/>
+          </a:stretch>
+        </p:blipFill>
+        <p:spPr>
+          <a:xfrm>
+            <a:off x="218238" y="8056384"/>
+            <a:ext cx="7772400" cy="2503154"/>
+          </a:xfrm>
+          <a:prstGeom prst="rect">
+            <a:avLst/>
+          </a:prstGeom>
+        </p:spPr>
+      </p:pic>
+      <p:pic>
+        <p:nvPicPr>
+          <p:cNvPr id="3" name="Picture 2">
+            <a:extLst>
+              <a:ext uri="{FF2B5EF4-FFF2-40B4-BE49-F238E27FC236}">
+                <a16:creationId xmlns:a16="http://schemas.microsoft.com/office/drawing/2014/main" id="{17789489-E55B-8C28-13F0-826147ED8BD0}"/>
+              </a:ext>
+            </a:extLst>
+          </p:cNvPr>
+          <p:cNvPicPr>
+            <a:picLocks noChangeAspect="1"/>
+          </p:cNvPicPr>
+          <p:nvPr/>
+        </p:nvPicPr>
+        <p:blipFill>
+          <a:blip r:embed="rId8"/>
+          <a:stretch>
+            <a:fillRect/>
+          </a:stretch>
+        </p:blipFill>
+        <p:spPr>
+          <a:xfrm>
+            <a:off x="8502180" y="5307057"/>
+            <a:ext cx="3340100" cy="2400300"/>
+          </a:xfrm>
+          <a:prstGeom prst="rect">
+            <a:avLst/>
+          </a:prstGeom>
+        </p:spPr>
+      </p:pic>
+      <p:pic>
+        <p:nvPicPr>
+          <p:cNvPr id="4" name="Picture 3">
+            <a:extLst>
+              <a:ext uri="{FF2B5EF4-FFF2-40B4-BE49-F238E27FC236}">
+                <a16:creationId xmlns:a16="http://schemas.microsoft.com/office/drawing/2014/main" id="{8F5ED714-DD7B-435A-A9FF-958154842AE5}"/>
+              </a:ext>
+            </a:extLst>
+          </p:cNvPr>
+          <p:cNvPicPr>
+            <a:picLocks noChangeAspect="1"/>
+          </p:cNvPicPr>
+          <p:nvPr/>
+        </p:nvPicPr>
+        <p:blipFill>
+          <a:blip r:embed="rId9"/>
+          <a:stretch>
+            <a:fillRect/>
+          </a:stretch>
+        </p:blipFill>
+        <p:spPr>
+          <a:xfrm>
+            <a:off x="339574" y="5494752"/>
+            <a:ext cx="7772400" cy="2503154"/>
+          </a:xfrm>
+          <a:prstGeom prst="rect">
+            <a:avLst/>
+          </a:prstGeom>
+        </p:spPr>
+      </p:pic>
     </p:spTree>
     <p:extLst>
       <p:ext uri="{BB962C8B-B14F-4D97-AF65-F5344CB8AC3E}">
@@ -3678,21 +3832,25 @@
           <a:lstStyle/>
           <a:p>
             <a:r>
-              <a:rPr lang="en-US" sz="2400" b="1" dirty="0">
+              <a:rPr lang="en-US" sz="2400" b="1">
                 <a:latin typeface="Arial" panose="020B0604020202020204" pitchFamily="34" charset="0"/>
                 <a:cs typeface="Arial" panose="020B0604020202020204" pitchFamily="34" charset="0"/>
               </a:rPr>
               <a:t>ANM8 Second Threshold Aligned Movements</a:t>
             </a:r>
+            <a:endParaRPr lang="en-US" sz="2400" b="1" dirty="0">
+              <a:latin typeface="Arial" panose="020B0604020202020204" pitchFamily="34" charset="0"/>
+              <a:cs typeface="Arial" panose="020B0604020202020204" pitchFamily="34" charset="0"/>
+            </a:endParaRPr>
           </a:p>
         </p:txBody>
       </p:sp>
       <p:pic>
         <p:nvPicPr>
-          <p:cNvPr id="4" name="Picture 3">
-            <a:extLst>
-              <a:ext uri="{FF2B5EF4-FFF2-40B4-BE49-F238E27FC236}">
-                <a16:creationId xmlns:a16="http://schemas.microsoft.com/office/drawing/2014/main" id="{B5AAD66E-ABBB-C8C6-71C2-D193F11E15C1}"/>
+          <p:cNvPr id="26" name="Picture 25">
+            <a:extLst>
+              <a:ext uri="{FF2B5EF4-FFF2-40B4-BE49-F238E27FC236}">
+                <a16:creationId xmlns:a16="http://schemas.microsoft.com/office/drawing/2014/main" id="{D98C5E3B-48A2-BCC4-4E8D-F16B74E493FE}"/>
               </a:ext>
             </a:extLst>
           </p:cNvPr>
@@ -3709,8 +3867,8 @@
         </p:blipFill>
         <p:spPr>
           <a:xfrm>
-            <a:off x="8179019" y="544356"/>
-            <a:ext cx="3314700" cy="2400300"/>
+            <a:off x="8305740" y="462603"/>
+            <a:ext cx="3263900" cy="2400300"/>
           </a:xfrm>
           <a:prstGeom prst="rect">
             <a:avLst/>
@@ -3719,10 +3877,10 @@
       </p:pic>
       <p:pic>
         <p:nvPicPr>
-          <p:cNvPr id="5" name="Picture 4">
-            <a:extLst>
-              <a:ext uri="{FF2B5EF4-FFF2-40B4-BE49-F238E27FC236}">
-                <a16:creationId xmlns:a16="http://schemas.microsoft.com/office/drawing/2014/main" id="{95D3AB80-2467-7A00-73C6-78F30EA8F29F}"/>
+          <p:cNvPr id="27" name="Picture 26">
+            <a:extLst>
+              <a:ext uri="{FF2B5EF4-FFF2-40B4-BE49-F238E27FC236}">
+                <a16:creationId xmlns:a16="http://schemas.microsoft.com/office/drawing/2014/main" id="{9AF669AD-56E2-D798-8B87-D76FAFF83BF0}"/>
               </a:ext>
             </a:extLst>
           </p:cNvPr>
@@ -3739,8 +3897,8 @@
         </p:blipFill>
         <p:spPr>
           <a:xfrm>
-            <a:off x="8394483" y="3674137"/>
-            <a:ext cx="3352800" cy="2400300"/>
+            <a:off x="8419272" y="3282749"/>
+            <a:ext cx="3302000" cy="2400300"/>
           </a:xfrm>
           <a:prstGeom prst="rect">
             <a:avLst/>
@@ -3749,10 +3907,10 @@
       </p:pic>
       <p:pic>
         <p:nvPicPr>
-          <p:cNvPr id="6" name="Picture 5">
-            <a:extLst>
-              <a:ext uri="{FF2B5EF4-FFF2-40B4-BE49-F238E27FC236}">
-                <a16:creationId xmlns:a16="http://schemas.microsoft.com/office/drawing/2014/main" id="{3B6918A0-C2D1-2331-7FFC-3D6690DB0991}"/>
+          <p:cNvPr id="28" name="Picture 27">
+            <a:extLst>
+              <a:ext uri="{FF2B5EF4-FFF2-40B4-BE49-F238E27FC236}">
+                <a16:creationId xmlns:a16="http://schemas.microsoft.com/office/drawing/2014/main" id="{B4860386-7245-9147-2A7A-25B62F696004}"/>
               </a:ext>
             </a:extLst>
           </p:cNvPr>
@@ -3769,55 +3927,20 @@
         </p:blipFill>
         <p:spPr>
           <a:xfrm>
-            <a:off x="0" y="800900"/>
-            <a:ext cx="7772400" cy="2503154"/>
+            <a:off x="8350190" y="6159954"/>
+            <a:ext cx="3263900" cy="2400300"/>
           </a:xfrm>
           <a:prstGeom prst="rect">
             <a:avLst/>
           </a:prstGeom>
         </p:spPr>
       </p:pic>
-      <p:sp>
-        <p:nvSpPr>
-          <p:cNvPr id="7" name="TextBox 6">
-            <a:extLst>
-              <a:ext uri="{FF2B5EF4-FFF2-40B4-BE49-F238E27FC236}">
-                <a16:creationId xmlns:a16="http://schemas.microsoft.com/office/drawing/2014/main" id="{E51C8047-7264-6A75-9CAF-F3B31A6BE440}"/>
-              </a:ext>
-            </a:extLst>
-          </p:cNvPr>
-          <p:cNvSpPr txBox="1"/>
-          <p:nvPr/>
-        </p:nvSpPr>
-        <p:spPr>
-          <a:xfrm>
-            <a:off x="10695214" y="1077686"/>
-            <a:ext cx="627095" cy="369332"/>
-          </a:xfrm>
-          <a:prstGeom prst="rect">
-            <a:avLst/>
-          </a:prstGeom>
-          <a:noFill/>
-        </p:spPr>
-        <p:txBody>
-          <a:bodyPr wrap="none" rtlCol="0">
-            <a:spAutoFit/>
-          </a:bodyPr>
-          <a:lstStyle/>
-          <a:p>
-            <a:r>
-              <a:rPr lang="en-US" dirty="0"/>
-              <a:t>Uh...</a:t>
-            </a:r>
-          </a:p>
-        </p:txBody>
-      </p:sp>
       <p:pic>
         <p:nvPicPr>
-          <p:cNvPr id="10" name="Picture 9">
-            <a:extLst>
-              <a:ext uri="{FF2B5EF4-FFF2-40B4-BE49-F238E27FC236}">
-                <a16:creationId xmlns:a16="http://schemas.microsoft.com/office/drawing/2014/main" id="{A3A3C37E-D8E9-78AE-99AB-67C221DE496B}"/>
+          <p:cNvPr id="29" name="Picture 28">
+            <a:extLst>
+              <a:ext uri="{FF2B5EF4-FFF2-40B4-BE49-F238E27FC236}">
+                <a16:creationId xmlns:a16="http://schemas.microsoft.com/office/drawing/2014/main" id="{915C1C75-A6D4-6639-C99A-2ACC888151FA}"/>
               </a:ext>
             </a:extLst>
           </p:cNvPr>
@@ -3834,7 +3957,187 @@
         </p:blipFill>
         <p:spPr>
           <a:xfrm>
-            <a:off x="201386" y="3674137"/>
+            <a:off x="8457372" y="9037159"/>
+            <a:ext cx="3263900" cy="2400300"/>
+          </a:xfrm>
+          <a:prstGeom prst="rect">
+            <a:avLst/>
+          </a:prstGeom>
+        </p:spPr>
+      </p:pic>
+      <p:pic>
+        <p:nvPicPr>
+          <p:cNvPr id="30" name="Picture 29">
+            <a:extLst>
+              <a:ext uri="{FF2B5EF4-FFF2-40B4-BE49-F238E27FC236}">
+                <a16:creationId xmlns:a16="http://schemas.microsoft.com/office/drawing/2014/main" id="{D489CBC9-BC77-45A9-6227-AC2055707493}"/>
+              </a:ext>
+            </a:extLst>
+          </p:cNvPr>
+          <p:cNvPicPr>
+            <a:picLocks noChangeAspect="1"/>
+          </p:cNvPicPr>
+          <p:nvPr/>
+        </p:nvPicPr>
+        <p:blipFill>
+          <a:blip r:embed="rId6"/>
+          <a:stretch>
+            <a:fillRect/>
+          </a:stretch>
+        </p:blipFill>
+        <p:spPr>
+          <a:xfrm>
+            <a:off x="8350190" y="12405834"/>
+            <a:ext cx="3302000" cy="2400300"/>
+          </a:xfrm>
+          <a:prstGeom prst="rect">
+            <a:avLst/>
+          </a:prstGeom>
+        </p:spPr>
+      </p:pic>
+      <p:pic>
+        <p:nvPicPr>
+          <p:cNvPr id="36" name="Picture 35">
+            <a:extLst>
+              <a:ext uri="{FF2B5EF4-FFF2-40B4-BE49-F238E27FC236}">
+                <a16:creationId xmlns:a16="http://schemas.microsoft.com/office/drawing/2014/main" id="{EB354C13-A263-BFAE-1B29-B64064B1EFD4}"/>
+              </a:ext>
+            </a:extLst>
+          </p:cNvPr>
+          <p:cNvPicPr>
+            <a:picLocks noChangeAspect="1"/>
+          </p:cNvPicPr>
+          <p:nvPr/>
+        </p:nvPicPr>
+        <p:blipFill>
+          <a:blip r:embed="rId7"/>
+          <a:stretch>
+            <a:fillRect/>
+          </a:stretch>
+        </p:blipFill>
+        <p:spPr>
+          <a:xfrm>
+            <a:off x="61" y="452053"/>
+            <a:ext cx="7772400" cy="2503154"/>
+          </a:xfrm>
+          <a:prstGeom prst="rect">
+            <a:avLst/>
+          </a:prstGeom>
+        </p:spPr>
+      </p:pic>
+      <p:pic>
+        <p:nvPicPr>
+          <p:cNvPr id="37" name="Picture 36">
+            <a:extLst>
+              <a:ext uri="{FF2B5EF4-FFF2-40B4-BE49-F238E27FC236}">
+                <a16:creationId xmlns:a16="http://schemas.microsoft.com/office/drawing/2014/main" id="{C187FA64-9946-A9E3-401A-7B77BD791CD5}"/>
+              </a:ext>
+            </a:extLst>
+          </p:cNvPr>
+          <p:cNvPicPr>
+            <a:picLocks noChangeAspect="1"/>
+          </p:cNvPicPr>
+          <p:nvPr/>
+        </p:nvPicPr>
+        <p:blipFill>
+          <a:blip r:embed="rId8"/>
+          <a:stretch>
+            <a:fillRect/>
+          </a:stretch>
+        </p:blipFill>
+        <p:spPr>
+          <a:xfrm>
+            <a:off x="61" y="3142681"/>
+            <a:ext cx="7772400" cy="2503154"/>
+          </a:xfrm>
+          <a:prstGeom prst="rect">
+            <a:avLst/>
+          </a:prstGeom>
+        </p:spPr>
+      </p:pic>
+      <p:pic>
+        <p:nvPicPr>
+          <p:cNvPr id="38" name="Picture 37">
+            <a:extLst>
+              <a:ext uri="{FF2B5EF4-FFF2-40B4-BE49-F238E27FC236}">
+                <a16:creationId xmlns:a16="http://schemas.microsoft.com/office/drawing/2014/main" id="{3FC2A06C-7FEA-0DA3-2A63-628D4A49C0BC}"/>
+              </a:ext>
+            </a:extLst>
+          </p:cNvPr>
+          <p:cNvPicPr>
+            <a:picLocks noChangeAspect="1"/>
+          </p:cNvPicPr>
+          <p:nvPr/>
+        </p:nvPicPr>
+        <p:blipFill>
+          <a:blip r:embed="rId9"/>
+          <a:stretch>
+            <a:fillRect/>
+          </a:stretch>
+        </p:blipFill>
+        <p:spPr>
+          <a:xfrm>
+            <a:off x="61" y="5949924"/>
+            <a:ext cx="7772400" cy="2503154"/>
+          </a:xfrm>
+          <a:prstGeom prst="rect">
+            <a:avLst/>
+          </a:prstGeom>
+        </p:spPr>
+      </p:pic>
+      <p:pic>
+        <p:nvPicPr>
+          <p:cNvPr id="39" name="Picture 38">
+            <a:extLst>
+              <a:ext uri="{FF2B5EF4-FFF2-40B4-BE49-F238E27FC236}">
+                <a16:creationId xmlns:a16="http://schemas.microsoft.com/office/drawing/2014/main" id="{08F5A2D5-F69A-2C45-9FC7-7BCF0EE67CF5}"/>
+              </a:ext>
+            </a:extLst>
+          </p:cNvPr>
+          <p:cNvPicPr>
+            <a:picLocks noChangeAspect="1"/>
+          </p:cNvPicPr>
+          <p:nvPr/>
+        </p:nvPicPr>
+        <p:blipFill>
+          <a:blip r:embed="rId10"/>
+          <a:stretch>
+            <a:fillRect/>
+          </a:stretch>
+        </p:blipFill>
+        <p:spPr>
+          <a:xfrm>
+            <a:off x="61" y="9038344"/>
+            <a:ext cx="7772400" cy="2503154"/>
+          </a:xfrm>
+          <a:prstGeom prst="rect">
+            <a:avLst/>
+          </a:prstGeom>
+        </p:spPr>
+      </p:pic>
+      <p:pic>
+        <p:nvPicPr>
+          <p:cNvPr id="40" name="Picture 39">
+            <a:extLst>
+              <a:ext uri="{FF2B5EF4-FFF2-40B4-BE49-F238E27FC236}">
+                <a16:creationId xmlns:a16="http://schemas.microsoft.com/office/drawing/2014/main" id="{FA92B4FD-2B4F-7336-2A62-E09DB22352EF}"/>
+              </a:ext>
+            </a:extLst>
+          </p:cNvPr>
+          <p:cNvPicPr>
+            <a:picLocks noChangeAspect="1"/>
+          </p:cNvPicPr>
+          <p:nvPr/>
+        </p:nvPicPr>
+        <p:blipFill>
+          <a:blip r:embed="rId11"/>
+          <a:stretch>
+            <a:fillRect/>
+          </a:stretch>
+        </p:blipFill>
+        <p:spPr>
+          <a:xfrm>
+            <a:off x="-44389" y="11959377"/>
             <a:ext cx="7772400" cy="2503154"/>
           </a:xfrm>
           <a:prstGeom prst="rect">
@@ -3912,10 +4215,10 @@
       </p:sp>
       <p:pic>
         <p:nvPicPr>
-          <p:cNvPr id="3" name="Picture 2">
-            <a:extLst>
-              <a:ext uri="{FF2B5EF4-FFF2-40B4-BE49-F238E27FC236}">
-                <a16:creationId xmlns:a16="http://schemas.microsoft.com/office/drawing/2014/main" id="{79F2308F-DEE3-ACA4-F51F-2CAD5E3C5516}"/>
+          <p:cNvPr id="10" name="Picture 9">
+            <a:extLst>
+              <a:ext uri="{FF2B5EF4-FFF2-40B4-BE49-F238E27FC236}">
+                <a16:creationId xmlns:a16="http://schemas.microsoft.com/office/drawing/2014/main" id="{E0E19E48-FA46-16DB-DC83-F7A55E7299DE}"/>
               </a:ext>
             </a:extLst>
           </p:cNvPr>
@@ -3932,8 +4235,8 @@
         </p:blipFill>
         <p:spPr>
           <a:xfrm>
-            <a:off x="8382000" y="544356"/>
-            <a:ext cx="3314700" cy="2400300"/>
+            <a:off x="8895372" y="263002"/>
+            <a:ext cx="2546351" cy="1872608"/>
           </a:xfrm>
           <a:prstGeom prst="rect">
             <a:avLst/>
@@ -3942,10 +4245,10 @@
       </p:pic>
       <p:pic>
         <p:nvPicPr>
-          <p:cNvPr id="4" name="Picture 3">
-            <a:extLst>
-              <a:ext uri="{FF2B5EF4-FFF2-40B4-BE49-F238E27FC236}">
-                <a16:creationId xmlns:a16="http://schemas.microsoft.com/office/drawing/2014/main" id="{28C726E7-7831-DE34-55CF-2EDD84BF7468}"/>
+          <p:cNvPr id="11" name="Picture 10">
+            <a:extLst>
+              <a:ext uri="{FF2B5EF4-FFF2-40B4-BE49-F238E27FC236}">
+                <a16:creationId xmlns:a16="http://schemas.microsoft.com/office/drawing/2014/main" id="{3C069D6F-C7CE-B13B-898B-63D0BE9D4661}"/>
               </a:ext>
             </a:extLst>
           </p:cNvPr>
@@ -3962,8 +4265,8 @@
         </p:blipFill>
         <p:spPr>
           <a:xfrm>
-            <a:off x="8643257" y="3745660"/>
-            <a:ext cx="3314700" cy="2400300"/>
+            <a:off x="8895372" y="2111075"/>
+            <a:ext cx="2546351" cy="1872608"/>
           </a:xfrm>
           <a:prstGeom prst="rect">
             <a:avLst/>
@@ -3972,10 +4275,10 @@
       </p:pic>
       <p:pic>
         <p:nvPicPr>
-          <p:cNvPr id="5" name="Picture 4">
-            <a:extLst>
-              <a:ext uri="{FF2B5EF4-FFF2-40B4-BE49-F238E27FC236}">
-                <a16:creationId xmlns:a16="http://schemas.microsoft.com/office/drawing/2014/main" id="{571E7FC7-4BF7-BA1F-9D19-E5A41BD9DF99}"/>
+          <p:cNvPr id="12" name="Picture 11">
+            <a:extLst>
+              <a:ext uri="{FF2B5EF4-FFF2-40B4-BE49-F238E27FC236}">
+                <a16:creationId xmlns:a16="http://schemas.microsoft.com/office/drawing/2014/main" id="{EB7EE048-201E-A598-F4C6-C921EB18B1AC}"/>
               </a:ext>
             </a:extLst>
           </p:cNvPr>
@@ -3992,8 +4295,8 @@
         </p:blipFill>
         <p:spPr>
           <a:xfrm>
-            <a:off x="381000" y="544356"/>
-            <a:ext cx="7772400" cy="2503154"/>
+            <a:off x="8895371" y="3983683"/>
+            <a:ext cx="2546351" cy="1872608"/>
           </a:xfrm>
           <a:prstGeom prst="rect">
             <a:avLst/>
@@ -4002,10 +4305,10 @@
       </p:pic>
       <p:pic>
         <p:nvPicPr>
-          <p:cNvPr id="6" name="Picture 5">
-            <a:extLst>
-              <a:ext uri="{FF2B5EF4-FFF2-40B4-BE49-F238E27FC236}">
-                <a16:creationId xmlns:a16="http://schemas.microsoft.com/office/drawing/2014/main" id="{13E98576-FB9D-AA9B-9424-62C99D593FF5}"/>
+          <p:cNvPr id="13" name="Picture 12">
+            <a:extLst>
+              <a:ext uri="{FF2B5EF4-FFF2-40B4-BE49-F238E27FC236}">
+                <a16:creationId xmlns:a16="http://schemas.microsoft.com/office/drawing/2014/main" id="{E4FCD9B3-F27C-82E5-C545-23E3A45C616C}"/>
               </a:ext>
             </a:extLst>
           </p:cNvPr>
@@ -4022,8 +4325,248 @@
         </p:blipFill>
         <p:spPr>
           <a:xfrm>
-            <a:off x="234043" y="3642806"/>
-            <a:ext cx="7772400" cy="2503154"/>
+            <a:off x="9018463" y="5831756"/>
+            <a:ext cx="2546351" cy="1872608"/>
+          </a:xfrm>
+          <a:prstGeom prst="rect">
+            <a:avLst/>
+          </a:prstGeom>
+        </p:spPr>
+      </p:pic>
+      <p:pic>
+        <p:nvPicPr>
+          <p:cNvPr id="14" name="Picture 13">
+            <a:extLst>
+              <a:ext uri="{FF2B5EF4-FFF2-40B4-BE49-F238E27FC236}">
+                <a16:creationId xmlns:a16="http://schemas.microsoft.com/office/drawing/2014/main" id="{C7550B80-A7B7-0B45-E001-BFC9AF155B12}"/>
+              </a:ext>
+            </a:extLst>
+          </p:cNvPr>
+          <p:cNvPicPr>
+            <a:picLocks noChangeAspect="1"/>
+          </p:cNvPicPr>
+          <p:nvPr/>
+        </p:nvPicPr>
+        <p:blipFill>
+          <a:blip r:embed="rId6"/>
+          <a:stretch>
+            <a:fillRect/>
+          </a:stretch>
+        </p:blipFill>
+        <p:spPr>
+          <a:xfrm>
+            <a:off x="9015345" y="7679829"/>
+            <a:ext cx="2426377" cy="1784378"/>
+          </a:xfrm>
+          <a:prstGeom prst="rect">
+            <a:avLst/>
+          </a:prstGeom>
+        </p:spPr>
+      </p:pic>
+      <p:pic>
+        <p:nvPicPr>
+          <p:cNvPr id="15" name="Picture 14">
+            <a:extLst>
+              <a:ext uri="{FF2B5EF4-FFF2-40B4-BE49-F238E27FC236}">
+                <a16:creationId xmlns:a16="http://schemas.microsoft.com/office/drawing/2014/main" id="{303F79F0-7D12-C1C9-5645-6140873F05C8}"/>
+              </a:ext>
+            </a:extLst>
+          </p:cNvPr>
+          <p:cNvPicPr>
+            <a:picLocks noChangeAspect="1"/>
+          </p:cNvPicPr>
+          <p:nvPr/>
+        </p:nvPicPr>
+        <p:blipFill>
+          <a:blip r:embed="rId7"/>
+          <a:stretch>
+            <a:fillRect/>
+          </a:stretch>
+        </p:blipFill>
+        <p:spPr>
+          <a:xfrm>
+            <a:off x="9015345" y="9464207"/>
+            <a:ext cx="2193684" cy="1613254"/>
+          </a:xfrm>
+          <a:prstGeom prst="rect">
+            <a:avLst/>
+          </a:prstGeom>
+        </p:spPr>
+      </p:pic>
+      <p:pic>
+        <p:nvPicPr>
+          <p:cNvPr id="16" name="Picture 15">
+            <a:extLst>
+              <a:ext uri="{FF2B5EF4-FFF2-40B4-BE49-F238E27FC236}">
+                <a16:creationId xmlns:a16="http://schemas.microsoft.com/office/drawing/2014/main" id="{E4356F9F-E87D-2F13-5283-152B21F4BFE8}"/>
+              </a:ext>
+            </a:extLst>
+          </p:cNvPr>
+          <p:cNvPicPr>
+            <a:picLocks noChangeAspect="1"/>
+          </p:cNvPicPr>
+          <p:nvPr/>
+        </p:nvPicPr>
+        <p:blipFill>
+          <a:blip r:embed="rId8"/>
+          <a:stretch>
+            <a:fillRect/>
+          </a:stretch>
+        </p:blipFill>
+        <p:spPr>
+          <a:xfrm>
+            <a:off x="627186" y="551030"/>
+            <a:ext cx="5849815" cy="1883972"/>
+          </a:xfrm>
+          <a:prstGeom prst="rect">
+            <a:avLst/>
+          </a:prstGeom>
+        </p:spPr>
+      </p:pic>
+      <p:pic>
+        <p:nvPicPr>
+          <p:cNvPr id="17" name="Picture 16">
+            <a:extLst>
+              <a:ext uri="{FF2B5EF4-FFF2-40B4-BE49-F238E27FC236}">
+                <a16:creationId xmlns:a16="http://schemas.microsoft.com/office/drawing/2014/main" id="{5C3C8AAD-1289-3E30-44CF-0C9787F95598}"/>
+              </a:ext>
+            </a:extLst>
+          </p:cNvPr>
+          <p:cNvPicPr>
+            <a:picLocks noChangeAspect="1"/>
+          </p:cNvPicPr>
+          <p:nvPr/>
+        </p:nvPicPr>
+        <p:blipFill>
+          <a:blip r:embed="rId9"/>
+          <a:stretch>
+            <a:fillRect/>
+          </a:stretch>
+        </p:blipFill>
+        <p:spPr>
+          <a:xfrm>
+            <a:off x="504094" y="2487014"/>
+            <a:ext cx="5849815" cy="1883972"/>
+          </a:xfrm>
+          <a:prstGeom prst="rect">
+            <a:avLst/>
+          </a:prstGeom>
+        </p:spPr>
+      </p:pic>
+      <p:pic>
+        <p:nvPicPr>
+          <p:cNvPr id="18" name="Picture 17">
+            <a:extLst>
+              <a:ext uri="{FF2B5EF4-FFF2-40B4-BE49-F238E27FC236}">
+                <a16:creationId xmlns:a16="http://schemas.microsoft.com/office/drawing/2014/main" id="{392F7D7A-463F-B2C4-B1AF-0CEAF3604805}"/>
+              </a:ext>
+            </a:extLst>
+          </p:cNvPr>
+          <p:cNvPicPr>
+            <a:picLocks noChangeAspect="1"/>
+          </p:cNvPicPr>
+          <p:nvPr/>
+        </p:nvPicPr>
+        <p:blipFill>
+          <a:blip r:embed="rId10"/>
+          <a:stretch>
+            <a:fillRect/>
+          </a:stretch>
+        </p:blipFill>
+        <p:spPr>
+          <a:xfrm>
+            <a:off x="381001" y="4377660"/>
+            <a:ext cx="5849815" cy="1883972"/>
+          </a:xfrm>
+          <a:prstGeom prst="rect">
+            <a:avLst/>
+          </a:prstGeom>
+        </p:spPr>
+      </p:pic>
+      <p:pic>
+        <p:nvPicPr>
+          <p:cNvPr id="19" name="Picture 18">
+            <a:extLst>
+              <a:ext uri="{FF2B5EF4-FFF2-40B4-BE49-F238E27FC236}">
+                <a16:creationId xmlns:a16="http://schemas.microsoft.com/office/drawing/2014/main" id="{20F59527-11A8-3114-57D6-1D47CA2DB5E1}"/>
+              </a:ext>
+            </a:extLst>
+          </p:cNvPr>
+          <p:cNvPicPr>
+            <a:picLocks noChangeAspect="1"/>
+          </p:cNvPicPr>
+          <p:nvPr/>
+        </p:nvPicPr>
+        <p:blipFill>
+          <a:blip r:embed="rId11"/>
+          <a:stretch>
+            <a:fillRect/>
+          </a:stretch>
+        </p:blipFill>
+        <p:spPr>
+          <a:xfrm>
+            <a:off x="442547" y="6261632"/>
+            <a:ext cx="5849815" cy="1883972"/>
+          </a:xfrm>
+          <a:prstGeom prst="rect">
+            <a:avLst/>
+          </a:prstGeom>
+        </p:spPr>
+      </p:pic>
+      <p:pic>
+        <p:nvPicPr>
+          <p:cNvPr id="20" name="Picture 19">
+            <a:extLst>
+              <a:ext uri="{FF2B5EF4-FFF2-40B4-BE49-F238E27FC236}">
+                <a16:creationId xmlns:a16="http://schemas.microsoft.com/office/drawing/2014/main" id="{7FCE5E89-882D-F376-DAC4-D828FF644361}"/>
+              </a:ext>
+            </a:extLst>
+          </p:cNvPr>
+          <p:cNvPicPr>
+            <a:picLocks noChangeAspect="1"/>
+          </p:cNvPicPr>
+          <p:nvPr/>
+        </p:nvPicPr>
+        <p:blipFill>
+          <a:blip r:embed="rId12"/>
+          <a:stretch>
+            <a:fillRect/>
+          </a:stretch>
+        </p:blipFill>
+        <p:spPr>
+          <a:xfrm>
+            <a:off x="381000" y="8204290"/>
+            <a:ext cx="5849815" cy="1883972"/>
+          </a:xfrm>
+          <a:prstGeom prst="rect">
+            <a:avLst/>
+          </a:prstGeom>
+        </p:spPr>
+      </p:pic>
+      <p:pic>
+        <p:nvPicPr>
+          <p:cNvPr id="21" name="Picture 20">
+            <a:extLst>
+              <a:ext uri="{FF2B5EF4-FFF2-40B4-BE49-F238E27FC236}">
+                <a16:creationId xmlns:a16="http://schemas.microsoft.com/office/drawing/2014/main" id="{82A69A38-052B-37F0-0763-2DD96C7D1086}"/>
+              </a:ext>
+            </a:extLst>
+          </p:cNvPr>
+          <p:cNvPicPr>
+            <a:picLocks noChangeAspect="1"/>
+          </p:cNvPicPr>
+          <p:nvPr/>
+        </p:nvPicPr>
+        <p:blipFill>
+          <a:blip r:embed="rId13"/>
+          <a:stretch>
+            <a:fillRect/>
+          </a:stretch>
+        </p:blipFill>
+        <p:spPr>
+          <a:xfrm>
+            <a:off x="442547" y="10209585"/>
+            <a:ext cx="5263662" cy="1695198"/>
           </a:xfrm>
           <a:prstGeom prst="rect">
             <a:avLst/>
@@ -4093,19 +4636,8 @@
                 <a:latin typeface="Arial" panose="020B0604020202020204" pitchFamily="34" charset="0"/>
                 <a:cs typeface="Arial" panose="020B0604020202020204" pitchFamily="34" charset="0"/>
               </a:rPr>
-              <a:t>Normalized total jerk (jerk ratio) from first threshold to peak of </a:t>
-            </a:r>
-            <a:r>
-              <a:rPr lang="en-US" sz="2400" b="1" dirty="0" err="1">
-                <a:latin typeface="Arial" panose="020B0604020202020204" pitchFamily="34" charset="0"/>
-                <a:cs typeface="Arial" panose="020B0604020202020204" pitchFamily="34" charset="0"/>
-              </a:rPr>
-              <a:t>leverpress</a:t>
-            </a:r>
-            <a:endParaRPr lang="en-US" sz="2400" b="1" dirty="0">
-              <a:latin typeface="Arial" panose="020B0604020202020204" pitchFamily="34" charset="0"/>
-              <a:cs typeface="Arial" panose="020B0604020202020204" pitchFamily="34" charset="0"/>
-            </a:endParaRPr>
+              <a:t>Normalized total jerk (jerk ratio) from first to third threshold</a:t>
+            </a:r>
           </a:p>
         </p:txBody>
       </p:sp>
@@ -4166,69 +4698,12 @@
           </a:p>
         </p:txBody>
       </p:sp>
-      <p:sp>
-        <p:nvSpPr>
-          <p:cNvPr id="17" name="Title 1">
-            <a:extLst>
-              <a:ext uri="{FF2B5EF4-FFF2-40B4-BE49-F238E27FC236}">
-                <a16:creationId xmlns:a16="http://schemas.microsoft.com/office/drawing/2014/main" id="{FF253B23-5EBF-A342-9B69-A05A2FBD3385}"/>
-              </a:ext>
-            </a:extLst>
-          </p:cNvPr>
-          <p:cNvSpPr txBox="1">
-            <a:spLocks/>
-          </p:cNvSpPr>
-          <p:nvPr/>
-        </p:nvSpPr>
-        <p:spPr>
-          <a:xfrm>
-            <a:off x="112511" y="4114056"/>
-            <a:ext cx="1603948" cy="970501"/>
-          </a:xfrm>
-          <a:prstGeom prst="rect">
-            <a:avLst/>
-          </a:prstGeom>
-        </p:spPr>
-        <p:txBody>
-          <a:bodyPr vert="horz" lIns="91440" tIns="45720" rIns="91440" bIns="45720" rtlCol="0" anchor="ctr">
-            <a:normAutofit/>
-          </a:bodyPr>
-          <a:lstStyle>
-            <a:lvl1pPr algn="l" defTabSz="914400" rtl="0" eaLnBrk="1" latinLnBrk="0" hangingPunct="1">
-              <a:lnSpc>
-                <a:spcPct val="90000"/>
-              </a:lnSpc>
-              <a:spcBef>
-                <a:spcPct val="0"/>
-              </a:spcBef>
-              <a:buNone/>
-              <a:defRPr sz="4400" kern="1200">
-                <a:solidFill>
-                  <a:schemeClr val="tx1"/>
-                </a:solidFill>
-                <a:latin typeface="+mj-lt"/>
-                <a:ea typeface="+mj-ea"/>
-                <a:cs typeface="+mj-cs"/>
-              </a:defRPr>
-            </a:lvl1pPr>
-          </a:lstStyle>
-          <a:p>
-            <a:r>
-              <a:rPr lang="en-US" sz="2400" b="1" dirty="0">
-                <a:latin typeface="Arial" panose="020B0604020202020204" pitchFamily="34" charset="0"/>
-                <a:cs typeface="Arial" panose="020B0604020202020204" pitchFamily="34" charset="0"/>
-              </a:rPr>
-              <a:t>ANA2</a:t>
-            </a:r>
-          </a:p>
-        </p:txBody>
-      </p:sp>
       <p:pic>
         <p:nvPicPr>
-          <p:cNvPr id="3" name="Picture 2">
-            <a:extLst>
-              <a:ext uri="{FF2B5EF4-FFF2-40B4-BE49-F238E27FC236}">
-                <a16:creationId xmlns:a16="http://schemas.microsoft.com/office/drawing/2014/main" id="{0D3C744D-6CCC-34E4-1F93-54A8BA9B5C0A}"/>
+          <p:cNvPr id="5" name="Picture 4">
+            <a:extLst>
+              <a:ext uri="{FF2B5EF4-FFF2-40B4-BE49-F238E27FC236}">
+                <a16:creationId xmlns:a16="http://schemas.microsoft.com/office/drawing/2014/main" id="{DF4A19CF-B57E-E0BF-1724-FF8AB6CE0346}"/>
               </a:ext>
             </a:extLst>
           </p:cNvPr>
@@ -4245,7 +4720,97 @@
         </p:blipFill>
         <p:spPr>
           <a:xfrm>
-            <a:off x="2249714" y="865569"/>
+            <a:off x="1724542" y="865569"/>
+            <a:ext cx="3022600" cy="2400300"/>
+          </a:xfrm>
+          <a:prstGeom prst="rect">
+            <a:avLst/>
+          </a:prstGeom>
+        </p:spPr>
+      </p:pic>
+      <p:pic>
+        <p:nvPicPr>
+          <p:cNvPr id="6" name="Picture 5">
+            <a:extLst>
+              <a:ext uri="{FF2B5EF4-FFF2-40B4-BE49-F238E27FC236}">
+                <a16:creationId xmlns:a16="http://schemas.microsoft.com/office/drawing/2014/main" id="{AFF954F0-36E9-DBFB-D044-9B05DE2B4874}"/>
+              </a:ext>
+            </a:extLst>
+          </p:cNvPr>
+          <p:cNvPicPr>
+            <a:picLocks noChangeAspect="1"/>
+          </p:cNvPicPr>
+          <p:nvPr/>
+        </p:nvPicPr>
+        <p:blipFill>
+          <a:blip r:embed="rId3"/>
+          <a:stretch>
+            <a:fillRect/>
+          </a:stretch>
+        </p:blipFill>
+        <p:spPr>
+          <a:xfrm>
+            <a:off x="5292066" y="1058892"/>
+            <a:ext cx="3022600" cy="2400300"/>
+          </a:xfrm>
+          <a:prstGeom prst="rect">
+            <a:avLst/>
+          </a:prstGeom>
+        </p:spPr>
+      </p:pic>
+      <p:pic>
+        <p:nvPicPr>
+          <p:cNvPr id="7" name="Picture 6">
+            <a:extLst>
+              <a:ext uri="{FF2B5EF4-FFF2-40B4-BE49-F238E27FC236}">
+                <a16:creationId xmlns:a16="http://schemas.microsoft.com/office/drawing/2014/main" id="{67819E93-B2DC-7EBA-B99B-C1598D9375D4}"/>
+              </a:ext>
+            </a:extLst>
+          </p:cNvPr>
+          <p:cNvPicPr>
+            <a:picLocks noChangeAspect="1"/>
+          </p:cNvPicPr>
+          <p:nvPr/>
+        </p:nvPicPr>
+        <p:blipFill>
+          <a:blip r:embed="rId4"/>
+          <a:stretch>
+            <a:fillRect/>
+          </a:stretch>
+        </p:blipFill>
+        <p:spPr>
+          <a:xfrm>
+            <a:off x="8656368" y="947520"/>
+            <a:ext cx="3022600" cy="2400300"/>
+          </a:xfrm>
+          <a:prstGeom prst="rect">
+            <a:avLst/>
+          </a:prstGeom>
+        </p:spPr>
+      </p:pic>
+      <p:pic>
+        <p:nvPicPr>
+          <p:cNvPr id="8" name="Picture 7">
+            <a:extLst>
+              <a:ext uri="{FF2B5EF4-FFF2-40B4-BE49-F238E27FC236}">
+                <a16:creationId xmlns:a16="http://schemas.microsoft.com/office/drawing/2014/main" id="{BC3D0DE7-7CA0-1D35-F0DA-1168A82CFB92}"/>
+              </a:ext>
+            </a:extLst>
+          </p:cNvPr>
+          <p:cNvPicPr>
+            <a:picLocks noChangeAspect="1"/>
+          </p:cNvPicPr>
+          <p:nvPr/>
+        </p:nvPicPr>
+        <p:blipFill>
+          <a:blip r:embed="rId5"/>
+          <a:stretch>
+            <a:fillRect/>
+          </a:stretch>
+        </p:blipFill>
+        <p:spPr>
+          <a:xfrm>
+            <a:off x="8906968" y="3729845"/>
             <a:ext cx="3022600" cy="2400300"/>
           </a:xfrm>
           <a:prstGeom prst="rect">
@@ -4316,21 +4881,7 @@
                 <a:latin typeface="Arial" panose="020B0604020202020204" pitchFamily="34" charset="0"/>
                 <a:cs typeface="Arial" panose="020B0604020202020204" pitchFamily="34" charset="0"/>
               </a:rPr>
-              <a:t>Normalized total jerk (jerk ratio) from first threshold to peak of </a:t>
-            </a:r>
-            <a:r>
-              <a:rPr lang="en-US" sz="2400" b="1" dirty="0" err="1">
-                <a:latin typeface="Arial" panose="020B0604020202020204" pitchFamily="34" charset="0"/>
-                <a:cs typeface="Arial" panose="020B0604020202020204" pitchFamily="34" charset="0"/>
-              </a:rPr>
-              <a:t>leverpress</a:t>
-            </a:r>
-            <a:r>
-              <a:rPr lang="en-US" sz="2400" b="1" dirty="0">
-                <a:latin typeface="Arial" panose="020B0604020202020204" pitchFamily="34" charset="0"/>
-                <a:cs typeface="Arial" panose="020B0604020202020204" pitchFamily="34" charset="0"/>
-              </a:rPr>
-              <a:t> (not full lever press right now because of weird electrical thing)</a:t>
+              <a:t>Normalized total jerk (jerk ratio) from first to third threshold</a:t>
             </a:r>
           </a:p>
         </p:txBody>
@@ -4387,158 +4938,11 @@
                 <a:latin typeface="Arial" panose="020B0604020202020204" pitchFamily="34" charset="0"/>
                 <a:cs typeface="Arial" panose="020B0604020202020204" pitchFamily="34" charset="0"/>
               </a:rPr>
-              <a:t>ANB1</a:t>
-            </a:r>
-          </a:p>
-        </p:txBody>
-      </p:sp>
-      <p:sp>
-        <p:nvSpPr>
-          <p:cNvPr id="19" name="Title 1">
-            <a:extLst>
-              <a:ext uri="{FF2B5EF4-FFF2-40B4-BE49-F238E27FC236}">
-                <a16:creationId xmlns:a16="http://schemas.microsoft.com/office/drawing/2014/main" id="{DFF1D5B2-E34C-1007-51A4-25C40131E1A4}"/>
-              </a:ext>
-            </a:extLst>
-          </p:cNvPr>
-          <p:cNvSpPr txBox="1">
-            <a:spLocks/>
-          </p:cNvSpPr>
-          <p:nvPr/>
-        </p:nvSpPr>
-        <p:spPr>
-          <a:xfrm>
-            <a:off x="484616" y="5628312"/>
-            <a:ext cx="1603948" cy="970501"/>
-          </a:xfrm>
-          <a:prstGeom prst="rect">
-            <a:avLst/>
-          </a:prstGeom>
-        </p:spPr>
-        <p:txBody>
-          <a:bodyPr vert="horz" lIns="91440" tIns="45720" rIns="91440" bIns="45720" rtlCol="0" anchor="ctr">
-            <a:normAutofit/>
-          </a:bodyPr>
-          <a:lstStyle>
-            <a:lvl1pPr algn="l" defTabSz="914400" rtl="0" eaLnBrk="1" latinLnBrk="0" hangingPunct="1">
-              <a:lnSpc>
-                <a:spcPct val="90000"/>
-              </a:lnSpc>
-              <a:spcBef>
-                <a:spcPct val="0"/>
-              </a:spcBef>
-              <a:buNone/>
-              <a:defRPr sz="4400" kern="1200">
-                <a:solidFill>
-                  <a:schemeClr val="tx1"/>
-                </a:solidFill>
-                <a:latin typeface="+mj-lt"/>
-                <a:ea typeface="+mj-ea"/>
-                <a:cs typeface="+mj-cs"/>
-              </a:defRPr>
-            </a:lvl1pPr>
-          </a:lstStyle>
-          <a:p>
-            <a:r>
-              <a:rPr lang="en-US" sz="2400" b="1" dirty="0">
-                <a:latin typeface="Arial" panose="020B0604020202020204" pitchFamily="34" charset="0"/>
-                <a:cs typeface="Arial" panose="020B0604020202020204" pitchFamily="34" charset="0"/>
-              </a:rPr>
-              <a:t>ANB2</a:t>
-            </a:r>
-          </a:p>
-        </p:txBody>
-      </p:sp>
-      <p:pic>
-        <p:nvPicPr>
-          <p:cNvPr id="7" name="Picture 6">
-            <a:extLst>
-              <a:ext uri="{FF2B5EF4-FFF2-40B4-BE49-F238E27FC236}">
-                <a16:creationId xmlns:a16="http://schemas.microsoft.com/office/drawing/2014/main" id="{047E3B3C-3606-1272-F20F-7B9BA76391DC}"/>
-              </a:ext>
-            </a:extLst>
-          </p:cNvPr>
-          <p:cNvPicPr>
-            <a:picLocks noChangeAspect="1"/>
-          </p:cNvPicPr>
-          <p:nvPr/>
-        </p:nvPicPr>
-        <p:blipFill>
-          <a:blip r:embed="rId2"/>
-          <a:stretch>
-            <a:fillRect/>
-          </a:stretch>
-        </p:blipFill>
-        <p:spPr>
-          <a:xfrm>
-            <a:off x="2235884" y="4581583"/>
-            <a:ext cx="2264075" cy="1797942"/>
-          </a:xfrm>
-          <a:prstGeom prst="rect">
-            <a:avLst/>
-          </a:prstGeom>
-        </p:spPr>
-      </p:pic>
-      <p:pic>
-        <p:nvPicPr>
-          <p:cNvPr id="8" name="Picture 7">
-            <a:extLst>
-              <a:ext uri="{FF2B5EF4-FFF2-40B4-BE49-F238E27FC236}">
-                <a16:creationId xmlns:a16="http://schemas.microsoft.com/office/drawing/2014/main" id="{B12695C4-C7D7-F33C-E49E-86CAE90FCAB8}"/>
-              </a:ext>
-            </a:extLst>
-          </p:cNvPr>
-          <p:cNvPicPr>
-            <a:picLocks noChangeAspect="1"/>
-          </p:cNvPicPr>
-          <p:nvPr/>
-        </p:nvPicPr>
-        <p:blipFill>
-          <a:blip r:embed="rId3"/>
-          <a:stretch>
-            <a:fillRect/>
-          </a:stretch>
-        </p:blipFill>
-        <p:spPr>
-          <a:xfrm>
-            <a:off x="5427968" y="4615457"/>
-            <a:ext cx="2264075" cy="1797942"/>
-          </a:xfrm>
-          <a:prstGeom prst="rect">
-            <a:avLst/>
-          </a:prstGeom>
-        </p:spPr>
-      </p:pic>
-      <p:pic>
-        <p:nvPicPr>
-          <p:cNvPr id="9" name="Picture 8">
-            <a:extLst>
-              <a:ext uri="{FF2B5EF4-FFF2-40B4-BE49-F238E27FC236}">
-                <a16:creationId xmlns:a16="http://schemas.microsoft.com/office/drawing/2014/main" id="{F3A0EF95-47D7-57AE-DD9D-A85F6AA22CC2}"/>
-              </a:ext>
-            </a:extLst>
-          </p:cNvPr>
-          <p:cNvPicPr>
-            <a:picLocks noChangeAspect="1"/>
-          </p:cNvPicPr>
-          <p:nvPr/>
-        </p:nvPicPr>
-        <p:blipFill>
-          <a:blip r:embed="rId4"/>
-          <a:stretch>
-            <a:fillRect/>
-          </a:stretch>
-        </p:blipFill>
-        <p:spPr>
-          <a:xfrm>
-            <a:off x="8962179" y="4800871"/>
-            <a:ext cx="2264075" cy="1797942"/>
-          </a:xfrm>
-          <a:prstGeom prst="rect">
-            <a:avLst/>
-          </a:prstGeom>
-        </p:spPr>
-      </p:pic>
+              <a:t>ANM8</a:t>
+            </a:r>
+          </a:p>
+        </p:txBody>
+      </p:sp>
     </p:spTree>
     <p:extLst>
       <p:ext uri="{BB962C8B-B14F-4D97-AF65-F5344CB8AC3E}">
@@ -4587,7 +4991,7 @@
         </p:nvSpPr>
         <p:spPr>
           <a:xfrm>
-            <a:off x="-1" y="104928"/>
+            <a:off x="-1" y="-104932"/>
             <a:ext cx="10837889" cy="970501"/>
           </a:xfrm>
         </p:spPr>
@@ -4602,78 +5006,132 @@
                 <a:latin typeface="Arial" panose="020B0604020202020204" pitchFamily="34" charset="0"/>
                 <a:cs typeface="Arial" panose="020B0604020202020204" pitchFamily="34" charset="0"/>
               </a:rPr>
-              <a:t>Normalized total jerk (jerk ratio) from first threshold to peak of </a:t>
-            </a:r>
-            <a:r>
-              <a:rPr lang="en-US" sz="2400" b="1" dirty="0" err="1">
-                <a:latin typeface="Arial" panose="020B0604020202020204" pitchFamily="34" charset="0"/>
-                <a:cs typeface="Arial" panose="020B0604020202020204" pitchFamily="34" charset="0"/>
-              </a:rPr>
-              <a:t>leverpress</a:t>
-            </a:r>
+              <a:t>Normalized total jerk (jerk ratio) from first to third threshold</a:t>
+            </a:r>
+          </a:p>
+        </p:txBody>
+      </p:sp>
+      <p:sp>
+        <p:nvSpPr>
+          <p:cNvPr id="18" name="Title 1">
+            <a:extLst>
+              <a:ext uri="{FF2B5EF4-FFF2-40B4-BE49-F238E27FC236}">
+                <a16:creationId xmlns:a16="http://schemas.microsoft.com/office/drawing/2014/main" id="{55D98E7D-6E43-19D0-73F3-5C9A35F86521}"/>
+              </a:ext>
+            </a:extLst>
+          </p:cNvPr>
+          <p:cNvSpPr txBox="1">
+            <a:spLocks/>
+          </p:cNvSpPr>
+          <p:nvPr/>
+        </p:nvSpPr>
+        <p:spPr>
+          <a:xfrm>
+            <a:off x="484616" y="1596206"/>
+            <a:ext cx="1603948" cy="970501"/>
+          </a:xfrm>
+          <a:prstGeom prst="rect">
+            <a:avLst/>
+          </a:prstGeom>
+        </p:spPr>
+        <p:txBody>
+          <a:bodyPr vert="horz" lIns="91440" tIns="45720" rIns="91440" bIns="45720" rtlCol="0" anchor="ctr">
+            <a:normAutofit/>
+          </a:bodyPr>
+          <a:lstStyle>
+            <a:lvl1pPr algn="l" defTabSz="914400" rtl="0" eaLnBrk="1" latinLnBrk="0" hangingPunct="1">
+              <a:lnSpc>
+                <a:spcPct val="90000"/>
+              </a:lnSpc>
+              <a:spcBef>
+                <a:spcPct val="0"/>
+              </a:spcBef>
+              <a:buNone/>
+              <a:defRPr sz="4400" kern="1200">
+                <a:solidFill>
+                  <a:schemeClr val="tx1"/>
+                </a:solidFill>
+                <a:latin typeface="+mj-lt"/>
+                <a:ea typeface="+mj-ea"/>
+                <a:cs typeface="+mj-cs"/>
+              </a:defRPr>
+            </a:lvl1pPr>
+          </a:lstStyle>
+          <a:p>
             <a:r>
               <a:rPr lang="en-US" sz="2400" b="1" dirty="0">
                 <a:latin typeface="Arial" panose="020B0604020202020204" pitchFamily="34" charset="0"/>
                 <a:cs typeface="Arial" panose="020B0604020202020204" pitchFamily="34" charset="0"/>
               </a:rPr>
-              <a:t> (not full lever press right now because of weird electrical thing)</a:t>
-            </a:r>
-          </a:p>
-        </p:txBody>
-      </p:sp>
-      <p:sp>
-        <p:nvSpPr>
-          <p:cNvPr id="4" name="TextBox 3">
-            <a:extLst>
-              <a:ext uri="{FF2B5EF4-FFF2-40B4-BE49-F238E27FC236}">
-                <a16:creationId xmlns:a16="http://schemas.microsoft.com/office/drawing/2014/main" id="{9BBF4307-E7B1-D62D-995A-F67A14A17187}"/>
-              </a:ext>
-            </a:extLst>
-          </p:cNvPr>
-          <p:cNvSpPr txBox="1"/>
+              <a:t>ANM1</a:t>
+            </a:r>
+          </a:p>
+        </p:txBody>
+      </p:sp>
+      <p:pic>
+        <p:nvPicPr>
+          <p:cNvPr id="3" name="Picture 2">
+            <a:extLst>
+              <a:ext uri="{FF2B5EF4-FFF2-40B4-BE49-F238E27FC236}">
+                <a16:creationId xmlns:a16="http://schemas.microsoft.com/office/drawing/2014/main" id="{DABF3D80-32E8-DB5E-F864-A2AC4ACC2D70}"/>
+              </a:ext>
+            </a:extLst>
+          </p:cNvPr>
+          <p:cNvPicPr>
+            <a:picLocks noChangeAspect="1"/>
+          </p:cNvPicPr>
           <p:nvPr/>
-        </p:nvSpPr>
-        <p:spPr>
-          <a:xfrm>
-            <a:off x="3291615" y="6202360"/>
-            <a:ext cx="8900385" cy="646331"/>
+        </p:nvPicPr>
+        <p:blipFill>
+          <a:blip r:embed="rId2"/>
+          <a:stretch>
+            <a:fillRect/>
+          </a:stretch>
+        </p:blipFill>
+        <p:spPr>
+          <a:xfrm>
+            <a:off x="1962270" y="865569"/>
+            <a:ext cx="3022600" cy="2400300"/>
           </a:xfrm>
           <a:prstGeom prst="rect">
             <a:avLst/>
           </a:prstGeom>
-          <a:noFill/>
-        </p:spPr>
-        <p:txBody>
-          <a:bodyPr wrap="none" rtlCol="0">
-            <a:spAutoFit/>
-          </a:bodyPr>
-          <a:lstStyle/>
-          <a:p>
-            <a:r>
-              <a:rPr lang="en-US" dirty="0"/>
-              <a:t>Because data not ~N, plotting median +/- 95 </a:t>
-            </a:r>
-            <a:r>
-              <a:rPr lang="en-US" dirty="0" err="1"/>
-              <a:t>cdf</a:t>
-            </a:r>
-            <a:r>
-              <a:rPr lang="en-US" dirty="0"/>
-              <a:t> for now, but might go back to mean not sure</a:t>
-            </a:r>
-          </a:p>
-          <a:p>
-            <a:r>
-              <a:rPr lang="en-US" dirty="0"/>
-              <a:t>Yes, upper outliers are therefore cut off</a:t>
-            </a:r>
-          </a:p>
-        </p:txBody>
-      </p:sp>
+        </p:spPr>
+      </p:pic>
+      <p:pic>
+        <p:nvPicPr>
+          <p:cNvPr id="7" name="Picture 6">
+            <a:extLst>
+              <a:ext uri="{FF2B5EF4-FFF2-40B4-BE49-F238E27FC236}">
+                <a16:creationId xmlns:a16="http://schemas.microsoft.com/office/drawing/2014/main" id="{C9BB828A-C2B2-0580-865C-F202F1A0E4B5}"/>
+              </a:ext>
+            </a:extLst>
+          </p:cNvPr>
+          <p:cNvPicPr>
+            <a:picLocks noChangeAspect="1"/>
+          </p:cNvPicPr>
+          <p:nvPr/>
+        </p:nvPicPr>
+        <p:blipFill>
+          <a:blip r:embed="rId3"/>
+          <a:stretch>
+            <a:fillRect/>
+          </a:stretch>
+        </p:blipFill>
+        <p:spPr>
+          <a:xfrm>
+            <a:off x="5240308" y="865569"/>
+            <a:ext cx="3022600" cy="2400300"/>
+          </a:xfrm>
+          <a:prstGeom prst="rect">
+            <a:avLst/>
+          </a:prstGeom>
+        </p:spPr>
+      </p:pic>
     </p:spTree>
     <p:extLst>
       <p:ext uri="{BB962C8B-B14F-4D97-AF65-F5344CB8AC3E}">
-        <p14:creationId xmlns:p14="http://schemas.microsoft.com/office/powerpoint/2010/main" val="3990869466"/>
+        <p14:creationId xmlns:p14="http://schemas.microsoft.com/office/powerpoint/2010/main" val="3772282094"/>
       </p:ext>
     </p:extLst>
   </p:cSld>
@@ -4718,8 +5176,8 @@
         </p:nvSpPr>
         <p:spPr>
           <a:xfrm>
-            <a:off x="0" y="0"/>
-            <a:ext cx="10515600" cy="544356"/>
+            <a:off x="-1" y="104928"/>
+            <a:ext cx="10837889" cy="970501"/>
           </a:xfrm>
         </p:spPr>
         <p:txBody>
@@ -4733,7 +5191,70 @@
                 <a:latin typeface="Arial" panose="020B0604020202020204" pitchFamily="34" charset="0"/>
                 <a:cs typeface="Arial" panose="020B0604020202020204" pitchFamily="34" charset="0"/>
               </a:rPr>
-              <a:t>Temporal compression of the movement?</a:t>
+              <a:t>Normalized total jerk (jerk ratio) from first threshold to peak of </a:t>
+            </a:r>
+            <a:r>
+              <a:rPr lang="en-US" sz="2400" b="1" dirty="0" err="1">
+                <a:latin typeface="Arial" panose="020B0604020202020204" pitchFamily="34" charset="0"/>
+                <a:cs typeface="Arial" panose="020B0604020202020204" pitchFamily="34" charset="0"/>
+              </a:rPr>
+              <a:t>leverpress</a:t>
+            </a:r>
+            <a:r>
+              <a:rPr lang="en-US" sz="2400" b="1" dirty="0">
+                <a:latin typeface="Arial" panose="020B0604020202020204" pitchFamily="34" charset="0"/>
+                <a:cs typeface="Arial" panose="020B0604020202020204" pitchFamily="34" charset="0"/>
+              </a:rPr>
+              <a:t> (not full lever press right now because of weird electrical thing)</a:t>
+            </a:r>
+          </a:p>
+        </p:txBody>
+      </p:sp>
+      <p:sp>
+        <p:nvSpPr>
+          <p:cNvPr id="4" name="TextBox 3">
+            <a:extLst>
+              <a:ext uri="{FF2B5EF4-FFF2-40B4-BE49-F238E27FC236}">
+                <a16:creationId xmlns:a16="http://schemas.microsoft.com/office/drawing/2014/main" id="{9BBF4307-E7B1-D62D-995A-F67A14A17187}"/>
+              </a:ext>
+            </a:extLst>
+          </p:cNvPr>
+          <p:cNvSpPr txBox="1"/>
+          <p:nvPr/>
+        </p:nvSpPr>
+        <p:spPr>
+          <a:xfrm>
+            <a:off x="3291615" y="6202360"/>
+            <a:ext cx="8900385" cy="646331"/>
+          </a:xfrm>
+          <a:prstGeom prst="rect">
+            <a:avLst/>
+          </a:prstGeom>
+          <a:noFill/>
+        </p:spPr>
+        <p:txBody>
+          <a:bodyPr wrap="none" rtlCol="0">
+            <a:spAutoFit/>
+          </a:bodyPr>
+          <a:lstStyle/>
+          <a:p>
+            <a:r>
+              <a:rPr lang="en-US" dirty="0"/>
+              <a:t>Because data not ~N, plotting median +/- 95 </a:t>
+            </a:r>
+            <a:r>
+              <a:rPr lang="en-US" dirty="0" err="1"/>
+              <a:t>cdf</a:t>
+            </a:r>
+            <a:r>
+              <a:rPr lang="en-US" dirty="0"/>
+              <a:t> for now, but might go back to mean not sure</a:t>
+            </a:r>
+          </a:p>
+          <a:p>
+            <a:r>
+              <a:rPr lang="en-US" dirty="0"/>
+              <a:t>Yes, upper outliers are therefore cut off</a:t>
             </a:r>
           </a:p>
         </p:txBody>
@@ -4741,7 +5262,7 @@
     </p:spTree>
     <p:extLst>
       <p:ext uri="{BB962C8B-B14F-4D97-AF65-F5344CB8AC3E}">
-        <p14:creationId xmlns:p14="http://schemas.microsoft.com/office/powerpoint/2010/main" val="3532051170"/>
+        <p14:creationId xmlns:p14="http://schemas.microsoft.com/office/powerpoint/2010/main" val="3990869466"/>
       </p:ext>
     </p:extLst>
   </p:cSld>
@@ -4801,7 +5322,7 @@
                 <a:latin typeface="Arial" panose="020B0604020202020204" pitchFamily="34" charset="0"/>
                 <a:cs typeface="Arial" panose="020B0604020202020204" pitchFamily="34" charset="0"/>
               </a:rPr>
-              <a:t>Reaction times</a:t>
+              <a:t>Temporal compression of the movement?</a:t>
             </a:r>
           </a:p>
         </p:txBody>
@@ -4809,7 +5330,7 @@
     </p:spTree>
     <p:extLst>
       <p:ext uri="{BB962C8B-B14F-4D97-AF65-F5344CB8AC3E}">
-        <p14:creationId xmlns:p14="http://schemas.microsoft.com/office/powerpoint/2010/main" val="3037425040"/>
+        <p14:creationId xmlns:p14="http://schemas.microsoft.com/office/powerpoint/2010/main" val="3532051170"/>
       </p:ext>
     </p:extLst>
   </p:cSld>

</xml_diff>